<commit_message>
added Omicron results subsection
</commit_message>
<xml_diff>
--- a/paper/figures/Omicron/Omicron.pptx
+++ b/paper/figures/Omicron/Omicron.pptx
@@ -2,18 +2,18 @@
 <file path=ppt/presentation.xml><?xml version="1.0" encoding="utf-8"?>
 <p:presentation xmlns:a="http://schemas.openxmlformats.org/drawingml/2006/main" xmlns:r="http://schemas.openxmlformats.org/officeDocument/2006/relationships" xmlns:p="http://schemas.openxmlformats.org/presentationml/2006/main" saveSubsetFonts="1" autoCompressPictures="0">
   <p:sldMasterIdLst>
-    <p:sldMasterId id="2147483648" r:id="rId1"/>
+    <p:sldMasterId id="2147483672" r:id="rId1"/>
   </p:sldMasterIdLst>
   <p:sldIdLst>
     <p:sldId id="256" r:id="rId2"/>
   </p:sldIdLst>
-  <p:sldSz cx="12192000" cy="6858000"/>
+  <p:sldSz cx="12192000" cy="3475038"/>
   <p:notesSz cx="6858000" cy="9144000"/>
   <p:defaultTextStyle>
     <a:defPPr>
       <a:defRPr lang="en-US"/>
     </a:defPPr>
-    <a:lvl1pPr marL="0" algn="l" defTabSz="914400" rtl="0" eaLnBrk="1" latinLnBrk="0" hangingPunct="1">
+    <a:lvl1pPr marL="0" algn="l" defTabSz="457200" rtl="0" eaLnBrk="1" latinLnBrk="0" hangingPunct="1">
       <a:defRPr sz="1800" kern="1200">
         <a:solidFill>
           <a:schemeClr val="tx1"/>
@@ -23,7 +23,7 @@
         <a:cs typeface="+mn-cs"/>
       </a:defRPr>
     </a:lvl1pPr>
-    <a:lvl2pPr marL="457200" algn="l" defTabSz="914400" rtl="0" eaLnBrk="1" latinLnBrk="0" hangingPunct="1">
+    <a:lvl2pPr marL="457200" algn="l" defTabSz="457200" rtl="0" eaLnBrk="1" latinLnBrk="0" hangingPunct="1">
       <a:defRPr sz="1800" kern="1200">
         <a:solidFill>
           <a:schemeClr val="tx1"/>
@@ -33,7 +33,7 @@
         <a:cs typeface="+mn-cs"/>
       </a:defRPr>
     </a:lvl2pPr>
-    <a:lvl3pPr marL="914400" algn="l" defTabSz="914400" rtl="0" eaLnBrk="1" latinLnBrk="0" hangingPunct="1">
+    <a:lvl3pPr marL="914400" algn="l" defTabSz="457200" rtl="0" eaLnBrk="1" latinLnBrk="0" hangingPunct="1">
       <a:defRPr sz="1800" kern="1200">
         <a:solidFill>
           <a:schemeClr val="tx1"/>
@@ -43,7 +43,7 @@
         <a:cs typeface="+mn-cs"/>
       </a:defRPr>
     </a:lvl3pPr>
-    <a:lvl4pPr marL="1371600" algn="l" defTabSz="914400" rtl="0" eaLnBrk="1" latinLnBrk="0" hangingPunct="1">
+    <a:lvl4pPr marL="1371600" algn="l" defTabSz="457200" rtl="0" eaLnBrk="1" latinLnBrk="0" hangingPunct="1">
       <a:defRPr sz="1800" kern="1200">
         <a:solidFill>
           <a:schemeClr val="tx1"/>
@@ -53,7 +53,7 @@
         <a:cs typeface="+mn-cs"/>
       </a:defRPr>
     </a:lvl4pPr>
-    <a:lvl5pPr marL="1828800" algn="l" defTabSz="914400" rtl="0" eaLnBrk="1" latinLnBrk="0" hangingPunct="1">
+    <a:lvl5pPr marL="1828800" algn="l" defTabSz="457200" rtl="0" eaLnBrk="1" latinLnBrk="0" hangingPunct="1">
       <a:defRPr sz="1800" kern="1200">
         <a:solidFill>
           <a:schemeClr val="tx1"/>
@@ -63,7 +63,7 @@
         <a:cs typeface="+mn-cs"/>
       </a:defRPr>
     </a:lvl5pPr>
-    <a:lvl6pPr marL="2286000" algn="l" defTabSz="914400" rtl="0" eaLnBrk="1" latinLnBrk="0" hangingPunct="1">
+    <a:lvl6pPr marL="2286000" algn="l" defTabSz="457200" rtl="0" eaLnBrk="1" latinLnBrk="0" hangingPunct="1">
       <a:defRPr sz="1800" kern="1200">
         <a:solidFill>
           <a:schemeClr val="tx1"/>
@@ -73,7 +73,7 @@
         <a:cs typeface="+mn-cs"/>
       </a:defRPr>
     </a:lvl6pPr>
-    <a:lvl7pPr marL="2743200" algn="l" defTabSz="914400" rtl="0" eaLnBrk="1" latinLnBrk="0" hangingPunct="1">
+    <a:lvl7pPr marL="2743200" algn="l" defTabSz="457200" rtl="0" eaLnBrk="1" latinLnBrk="0" hangingPunct="1">
       <a:defRPr sz="1800" kern="1200">
         <a:solidFill>
           <a:schemeClr val="tx1"/>
@@ -83,7 +83,7 @@
         <a:cs typeface="+mn-cs"/>
       </a:defRPr>
     </a:lvl7pPr>
-    <a:lvl8pPr marL="3200400" algn="l" defTabSz="914400" rtl="0" eaLnBrk="1" latinLnBrk="0" hangingPunct="1">
+    <a:lvl8pPr marL="3200400" algn="l" defTabSz="457200" rtl="0" eaLnBrk="1" latinLnBrk="0" hangingPunct="1">
       <a:defRPr sz="1800" kern="1200">
         <a:solidFill>
           <a:schemeClr val="tx1"/>
@@ -93,7 +93,7 @@
         <a:cs typeface="+mn-cs"/>
       </a:defRPr>
     </a:lvl8pPr>
-    <a:lvl9pPr marL="3657600" algn="l" defTabSz="914400" rtl="0" eaLnBrk="1" latinLnBrk="0" hangingPunct="1">
+    <a:lvl9pPr marL="3657600" algn="l" defTabSz="457200" rtl="0" eaLnBrk="1" latinLnBrk="0" hangingPunct="1">
       <a:defRPr sz="1800" kern="1200">
         <a:solidFill>
           <a:schemeClr val="tx1"/>
@@ -104,6 +104,11 @@
       </a:defRPr>
     </a:lvl9pPr>
   </p:defaultTextStyle>
+  <p:extLst>
+    <p:ext uri="{EFAFB233-063F-42B5-8137-9DF3F51BA10A}">
+      <p15:sldGuideLst xmlns:p15="http://schemas.microsoft.com/office/powerpoint/2012/main"/>
+    </p:ext>
+  </p:extLst>
 </p:presentation>
 </file>
 
@@ -111,8 +116,682 @@
 <p1510:revInfo xmlns:a="http://schemas.openxmlformats.org/drawingml/2006/main" xmlns:r="http://schemas.openxmlformats.org/officeDocument/2006/relationships" xmlns:p1510="http://schemas.microsoft.com/office/powerpoint/2015/10/main">
   <p1510:revLst>
     <p1510:client id="{402C41D4-15BB-C74E-BA39-84AE62E3DD33}" v="4" dt="2021-12-04T01:23:41.035"/>
+    <p1510:client id="{C2A54DA6-4D0B-874D-8794-AC244D64A5BB}" v="6" dt="2021-12-04T03:44:48.517"/>
   </p1510:revLst>
 </p1510:revInfo>
+</file>
+
+<file path=ppt/changesInfos/changesInfo1.xml><?xml version="1.0" encoding="utf-8"?>
+<pc:chgInfo xmlns:a="http://schemas.openxmlformats.org/drawingml/2006/main" xmlns:r="http://schemas.openxmlformats.org/officeDocument/2006/relationships" xmlns:ac="http://schemas.microsoft.com/office/drawing/2013/main/command" xmlns:pc="http://schemas.microsoft.com/office/powerpoint/2013/main/command">
+  <pc:docChgLst>
+    <pc:chgData name="Bloom PhD, Jesse D" userId="e17e4af4-92ba-4f4f-89d8-f6d4f5501821" providerId="ADAL" clId="{C2A54DA6-4D0B-874D-8794-AC244D64A5BB}"/>
+    <pc:docChg chg="custSel modSld modMainMaster">
+      <pc:chgData name="Bloom PhD, Jesse D" userId="e17e4af4-92ba-4f4f-89d8-f6d4f5501821" providerId="ADAL" clId="{C2A54DA6-4D0B-874D-8794-AC244D64A5BB}" dt="2021-12-04T03:45:07.199" v="19" actId="1076"/>
+      <pc:docMkLst>
+        <pc:docMk/>
+      </pc:docMkLst>
+      <pc:sldChg chg="addSp delSp modSp mod">
+        <pc:chgData name="Bloom PhD, Jesse D" userId="e17e4af4-92ba-4f4f-89d8-f6d4f5501821" providerId="ADAL" clId="{C2A54DA6-4D0B-874D-8794-AC244D64A5BB}" dt="2021-12-04T03:45:07.199" v="19" actId="1076"/>
+        <pc:sldMkLst>
+          <pc:docMk/>
+          <pc:sldMk cId="2432573473" sldId="256"/>
+        </pc:sldMkLst>
+        <pc:spChg chg="del">
+          <ac:chgData name="Bloom PhD, Jesse D" userId="e17e4af4-92ba-4f4f-89d8-f6d4f5501821" providerId="ADAL" clId="{C2A54DA6-4D0B-874D-8794-AC244D64A5BB}" dt="2021-12-04T03:25:29.896" v="5" actId="21"/>
+          <ac:spMkLst>
+            <pc:docMk/>
+            <pc:sldMk cId="2432573473" sldId="256"/>
+            <ac:spMk id="8" creationId="{0A2DCC77-4547-B243-BA23-84A70436873F}"/>
+          </ac:spMkLst>
+        </pc:spChg>
+        <pc:spChg chg="del mod">
+          <ac:chgData name="Bloom PhD, Jesse D" userId="e17e4af4-92ba-4f4f-89d8-f6d4f5501821" providerId="ADAL" clId="{C2A54DA6-4D0B-874D-8794-AC244D64A5BB}" dt="2021-12-04T03:25:29.896" v="5" actId="21"/>
+          <ac:spMkLst>
+            <pc:docMk/>
+            <pc:sldMk cId="2432573473" sldId="256"/>
+            <ac:spMk id="9" creationId="{A2439F6C-3D25-B544-8BEB-022CB30EF76F}"/>
+          </ac:spMkLst>
+        </pc:spChg>
+        <pc:spChg chg="add del mod">
+          <ac:chgData name="Bloom PhD, Jesse D" userId="e17e4af4-92ba-4f4f-89d8-f6d4f5501821" providerId="ADAL" clId="{C2A54DA6-4D0B-874D-8794-AC244D64A5BB}" dt="2021-12-04T03:25:51.716" v="8" actId="21"/>
+          <ac:spMkLst>
+            <pc:docMk/>
+            <pc:sldMk cId="2432573473" sldId="256"/>
+            <ac:spMk id="11" creationId="{BA5FFC7C-305B-7C4B-98BA-B2F504C5EE65}"/>
+          </ac:spMkLst>
+        </pc:spChg>
+        <pc:spChg chg="add del mod">
+          <ac:chgData name="Bloom PhD, Jesse D" userId="e17e4af4-92ba-4f4f-89d8-f6d4f5501821" providerId="ADAL" clId="{C2A54DA6-4D0B-874D-8794-AC244D64A5BB}" dt="2021-12-04T03:25:51.716" v="8" actId="21"/>
+          <ac:spMkLst>
+            <pc:docMk/>
+            <pc:sldMk cId="2432573473" sldId="256"/>
+            <ac:spMk id="12" creationId="{1BBC5587-35AE-304D-A7CA-9FA0983485D6}"/>
+          </ac:spMkLst>
+        </pc:spChg>
+        <pc:spChg chg="add mod">
+          <ac:chgData name="Bloom PhD, Jesse D" userId="e17e4af4-92ba-4f4f-89d8-f6d4f5501821" providerId="ADAL" clId="{C2A54DA6-4D0B-874D-8794-AC244D64A5BB}" dt="2021-12-04T03:26:03.365" v="10"/>
+          <ac:spMkLst>
+            <pc:docMk/>
+            <pc:sldMk cId="2432573473" sldId="256"/>
+            <ac:spMk id="15" creationId="{F49D3BDC-B65E-1C47-B28C-89C8BC0E608C}"/>
+          </ac:spMkLst>
+        </pc:spChg>
+        <pc:spChg chg="add mod">
+          <ac:chgData name="Bloom PhD, Jesse D" userId="e17e4af4-92ba-4f4f-89d8-f6d4f5501821" providerId="ADAL" clId="{C2A54DA6-4D0B-874D-8794-AC244D64A5BB}" dt="2021-12-04T03:26:03.365" v="10"/>
+          <ac:spMkLst>
+            <pc:docMk/>
+            <pc:sldMk cId="2432573473" sldId="256"/>
+            <ac:spMk id="16" creationId="{E83D7207-314C-2744-B03A-AFB57F0C1C12}"/>
+          </ac:spMkLst>
+        </pc:spChg>
+        <pc:picChg chg="add mod">
+          <ac:chgData name="Bloom PhD, Jesse D" userId="e17e4af4-92ba-4f4f-89d8-f6d4f5501821" providerId="ADAL" clId="{C2A54DA6-4D0B-874D-8794-AC244D64A5BB}" dt="2021-12-04T03:45:07.199" v="19" actId="1076"/>
+          <ac:picMkLst>
+            <pc:docMk/>
+            <pc:sldMk cId="2432573473" sldId="256"/>
+            <ac:picMk id="3" creationId="{3F073BA8-3E66-BF47-9138-5B0D750AC3A2}"/>
+          </ac:picMkLst>
+        </pc:picChg>
+        <pc:picChg chg="del">
+          <ac:chgData name="Bloom PhD, Jesse D" userId="e17e4af4-92ba-4f4f-89d8-f6d4f5501821" providerId="ADAL" clId="{C2A54DA6-4D0B-874D-8794-AC244D64A5BB}" dt="2021-12-04T03:25:29.896" v="5" actId="21"/>
+          <ac:picMkLst>
+            <pc:docMk/>
+            <pc:sldMk cId="2432573473" sldId="256"/>
+            <ac:picMk id="5" creationId="{91A809A3-ED46-5A40-83D7-EF865668551C}"/>
+          </ac:picMkLst>
+        </pc:picChg>
+        <pc:picChg chg="add del mod">
+          <ac:chgData name="Bloom PhD, Jesse D" userId="e17e4af4-92ba-4f4f-89d8-f6d4f5501821" providerId="ADAL" clId="{C2A54DA6-4D0B-874D-8794-AC244D64A5BB}" dt="2021-12-04T03:25:51.716" v="8" actId="21"/>
+          <ac:picMkLst>
+            <pc:docMk/>
+            <pc:sldMk cId="2432573473" sldId="256"/>
+            <ac:picMk id="6" creationId="{571526C0-8A08-3D4F-8A0A-43038123E0D5}"/>
+          </ac:picMkLst>
+        </pc:picChg>
+        <pc:picChg chg="del mod">
+          <ac:chgData name="Bloom PhD, Jesse D" userId="e17e4af4-92ba-4f4f-89d8-f6d4f5501821" providerId="ADAL" clId="{C2A54DA6-4D0B-874D-8794-AC244D64A5BB}" dt="2021-12-04T03:25:29.896" v="5" actId="21"/>
+          <ac:picMkLst>
+            <pc:docMk/>
+            <pc:sldMk cId="2432573473" sldId="256"/>
+            <ac:picMk id="7" creationId="{608B2333-A233-B745-9768-07F904B1C6C2}"/>
+          </ac:picMkLst>
+        </pc:picChg>
+        <pc:picChg chg="add del mod">
+          <ac:chgData name="Bloom PhD, Jesse D" userId="e17e4af4-92ba-4f4f-89d8-f6d4f5501821" providerId="ADAL" clId="{C2A54DA6-4D0B-874D-8794-AC244D64A5BB}" dt="2021-12-04T03:25:51.716" v="8" actId="21"/>
+          <ac:picMkLst>
+            <pc:docMk/>
+            <pc:sldMk cId="2432573473" sldId="256"/>
+            <ac:picMk id="10" creationId="{EB1BCEC5-08DE-924B-8C97-2589EB984134}"/>
+          </ac:picMkLst>
+        </pc:picChg>
+        <pc:picChg chg="add del mod">
+          <ac:chgData name="Bloom PhD, Jesse D" userId="e17e4af4-92ba-4f4f-89d8-f6d4f5501821" providerId="ADAL" clId="{C2A54DA6-4D0B-874D-8794-AC244D64A5BB}" dt="2021-12-04T03:44:25.021" v="12" actId="478"/>
+          <ac:picMkLst>
+            <pc:docMk/>
+            <pc:sldMk cId="2432573473" sldId="256"/>
+            <ac:picMk id="13" creationId="{728F3261-DE74-B44C-960D-B89AC9B2CEA7}"/>
+          </ac:picMkLst>
+        </pc:picChg>
+        <pc:picChg chg="add mod">
+          <ac:chgData name="Bloom PhD, Jesse D" userId="e17e4af4-92ba-4f4f-89d8-f6d4f5501821" providerId="ADAL" clId="{C2A54DA6-4D0B-874D-8794-AC244D64A5BB}" dt="2021-12-04T03:26:03.365" v="10"/>
+          <ac:picMkLst>
+            <pc:docMk/>
+            <pc:sldMk cId="2432573473" sldId="256"/>
+            <ac:picMk id="14" creationId="{21580B54-017A-2145-807B-64089C2BAD71}"/>
+          </ac:picMkLst>
+        </pc:picChg>
+      </pc:sldChg>
+      <pc:sldMasterChg chg="modSp modSldLayout">
+        <pc:chgData name="Bloom PhD, Jesse D" userId="e17e4af4-92ba-4f4f-89d8-f6d4f5501821" providerId="ADAL" clId="{C2A54DA6-4D0B-874D-8794-AC244D64A5BB}" dt="2021-12-04T03:25:39.746" v="6"/>
+        <pc:sldMasterMkLst>
+          <pc:docMk/>
+          <pc:sldMasterMk cId="3687965219" sldId="2147483648"/>
+        </pc:sldMasterMkLst>
+        <pc:spChg chg="mod">
+          <ac:chgData name="Bloom PhD, Jesse D" userId="e17e4af4-92ba-4f4f-89d8-f6d4f5501821" providerId="ADAL" clId="{C2A54DA6-4D0B-874D-8794-AC244D64A5BB}" dt="2021-12-04T03:25:39.746" v="6"/>
+          <ac:spMkLst>
+            <pc:docMk/>
+            <pc:sldMasterMk cId="3687965219" sldId="2147483648"/>
+            <ac:spMk id="2" creationId="{3FCF26A2-8918-FD48-A8C9-D87FDEEA6B8E}"/>
+          </ac:spMkLst>
+        </pc:spChg>
+        <pc:spChg chg="mod">
+          <ac:chgData name="Bloom PhD, Jesse D" userId="e17e4af4-92ba-4f4f-89d8-f6d4f5501821" providerId="ADAL" clId="{C2A54DA6-4D0B-874D-8794-AC244D64A5BB}" dt="2021-12-04T03:25:39.746" v="6"/>
+          <ac:spMkLst>
+            <pc:docMk/>
+            <pc:sldMasterMk cId="3687965219" sldId="2147483648"/>
+            <ac:spMk id="3" creationId="{02A149E5-5B2D-D74D-A81B-11F0C153CB56}"/>
+          </ac:spMkLst>
+        </pc:spChg>
+        <pc:spChg chg="mod">
+          <ac:chgData name="Bloom PhD, Jesse D" userId="e17e4af4-92ba-4f4f-89d8-f6d4f5501821" providerId="ADAL" clId="{C2A54DA6-4D0B-874D-8794-AC244D64A5BB}" dt="2021-12-04T03:25:39.746" v="6"/>
+          <ac:spMkLst>
+            <pc:docMk/>
+            <pc:sldMasterMk cId="3687965219" sldId="2147483648"/>
+            <ac:spMk id="4" creationId="{B5D96435-9FDD-4441-9BAD-2ED7B8CB16B7}"/>
+          </ac:spMkLst>
+        </pc:spChg>
+        <pc:spChg chg="mod">
+          <ac:chgData name="Bloom PhD, Jesse D" userId="e17e4af4-92ba-4f4f-89d8-f6d4f5501821" providerId="ADAL" clId="{C2A54DA6-4D0B-874D-8794-AC244D64A5BB}" dt="2021-12-04T03:25:39.746" v="6"/>
+          <ac:spMkLst>
+            <pc:docMk/>
+            <pc:sldMasterMk cId="3687965219" sldId="2147483648"/>
+            <ac:spMk id="5" creationId="{40AE28FD-B9C4-E846-8372-5C5A181276D0}"/>
+          </ac:spMkLst>
+        </pc:spChg>
+        <pc:spChg chg="mod">
+          <ac:chgData name="Bloom PhD, Jesse D" userId="e17e4af4-92ba-4f4f-89d8-f6d4f5501821" providerId="ADAL" clId="{C2A54DA6-4D0B-874D-8794-AC244D64A5BB}" dt="2021-12-04T03:25:39.746" v="6"/>
+          <ac:spMkLst>
+            <pc:docMk/>
+            <pc:sldMasterMk cId="3687965219" sldId="2147483648"/>
+            <ac:spMk id="6" creationId="{F22CE91C-F3D2-094F-AD6B-CDA2D406829E}"/>
+          </ac:spMkLst>
+        </pc:spChg>
+        <pc:sldLayoutChg chg="modSp">
+          <pc:chgData name="Bloom PhD, Jesse D" userId="e17e4af4-92ba-4f4f-89d8-f6d4f5501821" providerId="ADAL" clId="{C2A54DA6-4D0B-874D-8794-AC244D64A5BB}" dt="2021-12-04T03:25:39.746" v="6"/>
+          <pc:sldLayoutMkLst>
+            <pc:docMk/>
+            <pc:sldMasterMk cId="3687965219" sldId="2147483648"/>
+            <pc:sldLayoutMk cId="2134378351" sldId="2147483649"/>
+          </pc:sldLayoutMkLst>
+          <pc:spChg chg="mod">
+            <ac:chgData name="Bloom PhD, Jesse D" userId="e17e4af4-92ba-4f4f-89d8-f6d4f5501821" providerId="ADAL" clId="{C2A54DA6-4D0B-874D-8794-AC244D64A5BB}" dt="2021-12-04T03:25:39.746" v="6"/>
+            <ac:spMkLst>
+              <pc:docMk/>
+              <pc:sldMasterMk cId="3687965219" sldId="2147483648"/>
+              <pc:sldLayoutMk cId="2134378351" sldId="2147483649"/>
+              <ac:spMk id="2" creationId="{16D1DDEB-72F7-FB46-8A56-11F4E6A578D5}"/>
+            </ac:spMkLst>
+          </pc:spChg>
+          <pc:spChg chg="mod">
+            <ac:chgData name="Bloom PhD, Jesse D" userId="e17e4af4-92ba-4f4f-89d8-f6d4f5501821" providerId="ADAL" clId="{C2A54DA6-4D0B-874D-8794-AC244D64A5BB}" dt="2021-12-04T03:25:39.746" v="6"/>
+            <ac:spMkLst>
+              <pc:docMk/>
+              <pc:sldMasterMk cId="3687965219" sldId="2147483648"/>
+              <pc:sldLayoutMk cId="2134378351" sldId="2147483649"/>
+              <ac:spMk id="3" creationId="{2BFA771A-FBDD-5B4E-81A5-357F4AE7ACCA}"/>
+            </ac:spMkLst>
+          </pc:spChg>
+        </pc:sldLayoutChg>
+        <pc:sldLayoutChg chg="modSp">
+          <pc:chgData name="Bloom PhD, Jesse D" userId="e17e4af4-92ba-4f4f-89d8-f6d4f5501821" providerId="ADAL" clId="{C2A54DA6-4D0B-874D-8794-AC244D64A5BB}" dt="2021-12-04T03:25:39.746" v="6"/>
+          <pc:sldLayoutMkLst>
+            <pc:docMk/>
+            <pc:sldMasterMk cId="3687965219" sldId="2147483648"/>
+            <pc:sldLayoutMk cId="2133098213" sldId="2147483651"/>
+          </pc:sldLayoutMkLst>
+          <pc:spChg chg="mod">
+            <ac:chgData name="Bloom PhD, Jesse D" userId="e17e4af4-92ba-4f4f-89d8-f6d4f5501821" providerId="ADAL" clId="{C2A54DA6-4D0B-874D-8794-AC244D64A5BB}" dt="2021-12-04T03:25:39.746" v="6"/>
+            <ac:spMkLst>
+              <pc:docMk/>
+              <pc:sldMasterMk cId="3687965219" sldId="2147483648"/>
+              <pc:sldLayoutMk cId="2133098213" sldId="2147483651"/>
+              <ac:spMk id="2" creationId="{B2484988-6B20-5144-ABBA-F3DE5C200D24}"/>
+            </ac:spMkLst>
+          </pc:spChg>
+          <pc:spChg chg="mod">
+            <ac:chgData name="Bloom PhD, Jesse D" userId="e17e4af4-92ba-4f4f-89d8-f6d4f5501821" providerId="ADAL" clId="{C2A54DA6-4D0B-874D-8794-AC244D64A5BB}" dt="2021-12-04T03:25:39.746" v="6"/>
+            <ac:spMkLst>
+              <pc:docMk/>
+              <pc:sldMasterMk cId="3687965219" sldId="2147483648"/>
+              <pc:sldLayoutMk cId="2133098213" sldId="2147483651"/>
+              <ac:spMk id="3" creationId="{4B23ECE6-D45F-F447-8AFB-60637FBE2A8A}"/>
+            </ac:spMkLst>
+          </pc:spChg>
+        </pc:sldLayoutChg>
+        <pc:sldLayoutChg chg="modSp">
+          <pc:chgData name="Bloom PhD, Jesse D" userId="e17e4af4-92ba-4f4f-89d8-f6d4f5501821" providerId="ADAL" clId="{C2A54DA6-4D0B-874D-8794-AC244D64A5BB}" dt="2021-12-04T03:25:39.746" v="6"/>
+          <pc:sldLayoutMkLst>
+            <pc:docMk/>
+            <pc:sldMasterMk cId="3687965219" sldId="2147483648"/>
+            <pc:sldLayoutMk cId="2735122962" sldId="2147483652"/>
+          </pc:sldLayoutMkLst>
+          <pc:spChg chg="mod">
+            <ac:chgData name="Bloom PhD, Jesse D" userId="e17e4af4-92ba-4f4f-89d8-f6d4f5501821" providerId="ADAL" clId="{C2A54DA6-4D0B-874D-8794-AC244D64A5BB}" dt="2021-12-04T03:25:39.746" v="6"/>
+            <ac:spMkLst>
+              <pc:docMk/>
+              <pc:sldMasterMk cId="3687965219" sldId="2147483648"/>
+              <pc:sldLayoutMk cId="2735122962" sldId="2147483652"/>
+              <ac:spMk id="3" creationId="{FBC79DBB-60D1-BD4D-B56F-4C1BF17912C8}"/>
+            </ac:spMkLst>
+          </pc:spChg>
+          <pc:spChg chg="mod">
+            <ac:chgData name="Bloom PhD, Jesse D" userId="e17e4af4-92ba-4f4f-89d8-f6d4f5501821" providerId="ADAL" clId="{C2A54DA6-4D0B-874D-8794-AC244D64A5BB}" dt="2021-12-04T03:25:39.746" v="6"/>
+            <ac:spMkLst>
+              <pc:docMk/>
+              <pc:sldMasterMk cId="3687965219" sldId="2147483648"/>
+              <pc:sldLayoutMk cId="2735122962" sldId="2147483652"/>
+              <ac:spMk id="4" creationId="{7E574347-F057-B54B-A05F-0234314EFA67}"/>
+            </ac:spMkLst>
+          </pc:spChg>
+        </pc:sldLayoutChg>
+        <pc:sldLayoutChg chg="modSp">
+          <pc:chgData name="Bloom PhD, Jesse D" userId="e17e4af4-92ba-4f4f-89d8-f6d4f5501821" providerId="ADAL" clId="{C2A54DA6-4D0B-874D-8794-AC244D64A5BB}" dt="2021-12-04T03:25:39.746" v="6"/>
+          <pc:sldLayoutMkLst>
+            <pc:docMk/>
+            <pc:sldMasterMk cId="3687965219" sldId="2147483648"/>
+            <pc:sldLayoutMk cId="2578277631" sldId="2147483653"/>
+          </pc:sldLayoutMkLst>
+          <pc:spChg chg="mod">
+            <ac:chgData name="Bloom PhD, Jesse D" userId="e17e4af4-92ba-4f4f-89d8-f6d4f5501821" providerId="ADAL" clId="{C2A54DA6-4D0B-874D-8794-AC244D64A5BB}" dt="2021-12-04T03:25:39.746" v="6"/>
+            <ac:spMkLst>
+              <pc:docMk/>
+              <pc:sldMasterMk cId="3687965219" sldId="2147483648"/>
+              <pc:sldLayoutMk cId="2578277631" sldId="2147483653"/>
+              <ac:spMk id="2" creationId="{6073CEF2-F156-8F40-833F-4F93305E3F2A}"/>
+            </ac:spMkLst>
+          </pc:spChg>
+          <pc:spChg chg="mod">
+            <ac:chgData name="Bloom PhD, Jesse D" userId="e17e4af4-92ba-4f4f-89d8-f6d4f5501821" providerId="ADAL" clId="{C2A54DA6-4D0B-874D-8794-AC244D64A5BB}" dt="2021-12-04T03:25:39.746" v="6"/>
+            <ac:spMkLst>
+              <pc:docMk/>
+              <pc:sldMasterMk cId="3687965219" sldId="2147483648"/>
+              <pc:sldLayoutMk cId="2578277631" sldId="2147483653"/>
+              <ac:spMk id="3" creationId="{FD12C90C-08BE-2C45-8B3E-9503983B20FB}"/>
+            </ac:spMkLst>
+          </pc:spChg>
+          <pc:spChg chg="mod">
+            <ac:chgData name="Bloom PhD, Jesse D" userId="e17e4af4-92ba-4f4f-89d8-f6d4f5501821" providerId="ADAL" clId="{C2A54DA6-4D0B-874D-8794-AC244D64A5BB}" dt="2021-12-04T03:25:39.746" v="6"/>
+            <ac:spMkLst>
+              <pc:docMk/>
+              <pc:sldMasterMk cId="3687965219" sldId="2147483648"/>
+              <pc:sldLayoutMk cId="2578277631" sldId="2147483653"/>
+              <ac:spMk id="4" creationId="{925F546B-B3EB-8845-8282-CD58DF142FB5}"/>
+            </ac:spMkLst>
+          </pc:spChg>
+          <pc:spChg chg="mod">
+            <ac:chgData name="Bloom PhD, Jesse D" userId="e17e4af4-92ba-4f4f-89d8-f6d4f5501821" providerId="ADAL" clId="{C2A54DA6-4D0B-874D-8794-AC244D64A5BB}" dt="2021-12-04T03:25:39.746" v="6"/>
+            <ac:spMkLst>
+              <pc:docMk/>
+              <pc:sldMasterMk cId="3687965219" sldId="2147483648"/>
+              <pc:sldLayoutMk cId="2578277631" sldId="2147483653"/>
+              <ac:spMk id="5" creationId="{914B08C9-DC60-6343-A991-F329760BD845}"/>
+            </ac:spMkLst>
+          </pc:spChg>
+          <pc:spChg chg="mod">
+            <ac:chgData name="Bloom PhD, Jesse D" userId="e17e4af4-92ba-4f4f-89d8-f6d4f5501821" providerId="ADAL" clId="{C2A54DA6-4D0B-874D-8794-AC244D64A5BB}" dt="2021-12-04T03:25:39.746" v="6"/>
+            <ac:spMkLst>
+              <pc:docMk/>
+              <pc:sldMasterMk cId="3687965219" sldId="2147483648"/>
+              <pc:sldLayoutMk cId="2578277631" sldId="2147483653"/>
+              <ac:spMk id="6" creationId="{37A73B35-21AA-7F48-A099-A39C68786FAB}"/>
+            </ac:spMkLst>
+          </pc:spChg>
+        </pc:sldLayoutChg>
+        <pc:sldLayoutChg chg="modSp">
+          <pc:chgData name="Bloom PhD, Jesse D" userId="e17e4af4-92ba-4f4f-89d8-f6d4f5501821" providerId="ADAL" clId="{C2A54DA6-4D0B-874D-8794-AC244D64A5BB}" dt="2021-12-04T03:25:39.746" v="6"/>
+          <pc:sldLayoutMkLst>
+            <pc:docMk/>
+            <pc:sldMasterMk cId="3687965219" sldId="2147483648"/>
+            <pc:sldLayoutMk cId="3678157726" sldId="2147483656"/>
+          </pc:sldLayoutMkLst>
+          <pc:spChg chg="mod">
+            <ac:chgData name="Bloom PhD, Jesse D" userId="e17e4af4-92ba-4f4f-89d8-f6d4f5501821" providerId="ADAL" clId="{C2A54DA6-4D0B-874D-8794-AC244D64A5BB}" dt="2021-12-04T03:25:39.746" v="6"/>
+            <ac:spMkLst>
+              <pc:docMk/>
+              <pc:sldMasterMk cId="3687965219" sldId="2147483648"/>
+              <pc:sldLayoutMk cId="3678157726" sldId="2147483656"/>
+              <ac:spMk id="2" creationId="{91CC5C5A-849F-4147-A377-2329A2103AC3}"/>
+            </ac:spMkLst>
+          </pc:spChg>
+          <pc:spChg chg="mod">
+            <ac:chgData name="Bloom PhD, Jesse D" userId="e17e4af4-92ba-4f4f-89d8-f6d4f5501821" providerId="ADAL" clId="{C2A54DA6-4D0B-874D-8794-AC244D64A5BB}" dt="2021-12-04T03:25:39.746" v="6"/>
+            <ac:spMkLst>
+              <pc:docMk/>
+              <pc:sldMasterMk cId="3687965219" sldId="2147483648"/>
+              <pc:sldLayoutMk cId="3678157726" sldId="2147483656"/>
+              <ac:spMk id="3" creationId="{10AD0CBD-053A-F941-B394-053F183D53F2}"/>
+            </ac:spMkLst>
+          </pc:spChg>
+          <pc:spChg chg="mod">
+            <ac:chgData name="Bloom PhD, Jesse D" userId="e17e4af4-92ba-4f4f-89d8-f6d4f5501821" providerId="ADAL" clId="{C2A54DA6-4D0B-874D-8794-AC244D64A5BB}" dt="2021-12-04T03:25:39.746" v="6"/>
+            <ac:spMkLst>
+              <pc:docMk/>
+              <pc:sldMasterMk cId="3687965219" sldId="2147483648"/>
+              <pc:sldLayoutMk cId="3678157726" sldId="2147483656"/>
+              <ac:spMk id="4" creationId="{756BEBF8-636E-EB42-90BE-8E113B3D81D3}"/>
+            </ac:spMkLst>
+          </pc:spChg>
+        </pc:sldLayoutChg>
+        <pc:sldLayoutChg chg="modSp">
+          <pc:chgData name="Bloom PhD, Jesse D" userId="e17e4af4-92ba-4f4f-89d8-f6d4f5501821" providerId="ADAL" clId="{C2A54DA6-4D0B-874D-8794-AC244D64A5BB}" dt="2021-12-04T03:25:39.746" v="6"/>
+          <pc:sldLayoutMkLst>
+            <pc:docMk/>
+            <pc:sldMasterMk cId="3687965219" sldId="2147483648"/>
+            <pc:sldLayoutMk cId="913262359" sldId="2147483657"/>
+          </pc:sldLayoutMkLst>
+          <pc:spChg chg="mod">
+            <ac:chgData name="Bloom PhD, Jesse D" userId="e17e4af4-92ba-4f4f-89d8-f6d4f5501821" providerId="ADAL" clId="{C2A54DA6-4D0B-874D-8794-AC244D64A5BB}" dt="2021-12-04T03:25:39.746" v="6"/>
+            <ac:spMkLst>
+              <pc:docMk/>
+              <pc:sldMasterMk cId="3687965219" sldId="2147483648"/>
+              <pc:sldLayoutMk cId="913262359" sldId="2147483657"/>
+              <ac:spMk id="2" creationId="{C062BF62-59B1-5245-90AB-6C64CD52939B}"/>
+            </ac:spMkLst>
+          </pc:spChg>
+          <pc:spChg chg="mod">
+            <ac:chgData name="Bloom PhD, Jesse D" userId="e17e4af4-92ba-4f4f-89d8-f6d4f5501821" providerId="ADAL" clId="{C2A54DA6-4D0B-874D-8794-AC244D64A5BB}" dt="2021-12-04T03:25:39.746" v="6"/>
+            <ac:spMkLst>
+              <pc:docMk/>
+              <pc:sldMasterMk cId="3687965219" sldId="2147483648"/>
+              <pc:sldLayoutMk cId="913262359" sldId="2147483657"/>
+              <ac:spMk id="3" creationId="{61248FB5-A9CF-A849-8970-076C56818D40}"/>
+            </ac:spMkLst>
+          </pc:spChg>
+          <pc:spChg chg="mod">
+            <ac:chgData name="Bloom PhD, Jesse D" userId="e17e4af4-92ba-4f4f-89d8-f6d4f5501821" providerId="ADAL" clId="{C2A54DA6-4D0B-874D-8794-AC244D64A5BB}" dt="2021-12-04T03:25:39.746" v="6"/>
+            <ac:spMkLst>
+              <pc:docMk/>
+              <pc:sldMasterMk cId="3687965219" sldId="2147483648"/>
+              <pc:sldLayoutMk cId="913262359" sldId="2147483657"/>
+              <ac:spMk id="4" creationId="{A0B0EA40-A847-A14D-A6C7-EAF2D3AA7EA0}"/>
+            </ac:spMkLst>
+          </pc:spChg>
+        </pc:sldLayoutChg>
+        <pc:sldLayoutChg chg="modSp">
+          <pc:chgData name="Bloom PhD, Jesse D" userId="e17e4af4-92ba-4f4f-89d8-f6d4f5501821" providerId="ADAL" clId="{C2A54DA6-4D0B-874D-8794-AC244D64A5BB}" dt="2021-12-04T03:25:39.746" v="6"/>
+          <pc:sldLayoutMkLst>
+            <pc:docMk/>
+            <pc:sldMasterMk cId="3687965219" sldId="2147483648"/>
+            <pc:sldLayoutMk cId="3038537464" sldId="2147483659"/>
+          </pc:sldLayoutMkLst>
+          <pc:spChg chg="mod">
+            <ac:chgData name="Bloom PhD, Jesse D" userId="e17e4af4-92ba-4f4f-89d8-f6d4f5501821" providerId="ADAL" clId="{C2A54DA6-4D0B-874D-8794-AC244D64A5BB}" dt="2021-12-04T03:25:39.746" v="6"/>
+            <ac:spMkLst>
+              <pc:docMk/>
+              <pc:sldMasterMk cId="3687965219" sldId="2147483648"/>
+              <pc:sldLayoutMk cId="3038537464" sldId="2147483659"/>
+              <ac:spMk id="2" creationId="{28F509BA-AEBE-0B44-B1E5-C80324C8F587}"/>
+            </ac:spMkLst>
+          </pc:spChg>
+          <pc:spChg chg="mod">
+            <ac:chgData name="Bloom PhD, Jesse D" userId="e17e4af4-92ba-4f4f-89d8-f6d4f5501821" providerId="ADAL" clId="{C2A54DA6-4D0B-874D-8794-AC244D64A5BB}" dt="2021-12-04T03:25:39.746" v="6"/>
+            <ac:spMkLst>
+              <pc:docMk/>
+              <pc:sldMasterMk cId="3687965219" sldId="2147483648"/>
+              <pc:sldLayoutMk cId="3038537464" sldId="2147483659"/>
+              <ac:spMk id="3" creationId="{244830EB-1F90-CB44-959F-7D90916AAE2D}"/>
+            </ac:spMkLst>
+          </pc:spChg>
+        </pc:sldLayoutChg>
+      </pc:sldMasterChg>
+      <pc:sldMasterChg chg="modSp modSldLayout">
+        <pc:chgData name="Bloom PhD, Jesse D" userId="e17e4af4-92ba-4f4f-89d8-f6d4f5501821" providerId="ADAL" clId="{C2A54DA6-4D0B-874D-8794-AC244D64A5BB}" dt="2021-12-04T03:26:02.078" v="9"/>
+        <pc:sldMasterMkLst>
+          <pc:docMk/>
+          <pc:sldMasterMk cId="1137334992" sldId="2147483660"/>
+        </pc:sldMasterMkLst>
+        <pc:spChg chg="mod">
+          <ac:chgData name="Bloom PhD, Jesse D" userId="e17e4af4-92ba-4f4f-89d8-f6d4f5501821" providerId="ADAL" clId="{C2A54DA6-4D0B-874D-8794-AC244D64A5BB}" dt="2021-12-04T03:26:02.078" v="9"/>
+          <ac:spMkLst>
+            <pc:docMk/>
+            <pc:sldMasterMk cId="1137334992" sldId="2147483660"/>
+            <ac:spMk id="2" creationId="{00000000-0000-0000-0000-000000000000}"/>
+          </ac:spMkLst>
+        </pc:spChg>
+        <pc:spChg chg="mod">
+          <ac:chgData name="Bloom PhD, Jesse D" userId="e17e4af4-92ba-4f4f-89d8-f6d4f5501821" providerId="ADAL" clId="{C2A54DA6-4D0B-874D-8794-AC244D64A5BB}" dt="2021-12-04T03:26:02.078" v="9"/>
+          <ac:spMkLst>
+            <pc:docMk/>
+            <pc:sldMasterMk cId="1137334992" sldId="2147483660"/>
+            <ac:spMk id="3" creationId="{00000000-0000-0000-0000-000000000000}"/>
+          </ac:spMkLst>
+        </pc:spChg>
+        <pc:spChg chg="mod">
+          <ac:chgData name="Bloom PhD, Jesse D" userId="e17e4af4-92ba-4f4f-89d8-f6d4f5501821" providerId="ADAL" clId="{C2A54DA6-4D0B-874D-8794-AC244D64A5BB}" dt="2021-12-04T03:26:02.078" v="9"/>
+          <ac:spMkLst>
+            <pc:docMk/>
+            <pc:sldMasterMk cId="1137334992" sldId="2147483660"/>
+            <ac:spMk id="4" creationId="{00000000-0000-0000-0000-000000000000}"/>
+          </ac:spMkLst>
+        </pc:spChg>
+        <pc:spChg chg="mod">
+          <ac:chgData name="Bloom PhD, Jesse D" userId="e17e4af4-92ba-4f4f-89d8-f6d4f5501821" providerId="ADAL" clId="{C2A54DA6-4D0B-874D-8794-AC244D64A5BB}" dt="2021-12-04T03:26:02.078" v="9"/>
+          <ac:spMkLst>
+            <pc:docMk/>
+            <pc:sldMasterMk cId="1137334992" sldId="2147483660"/>
+            <ac:spMk id="5" creationId="{00000000-0000-0000-0000-000000000000}"/>
+          </ac:spMkLst>
+        </pc:spChg>
+        <pc:spChg chg="mod">
+          <ac:chgData name="Bloom PhD, Jesse D" userId="e17e4af4-92ba-4f4f-89d8-f6d4f5501821" providerId="ADAL" clId="{C2A54DA6-4D0B-874D-8794-AC244D64A5BB}" dt="2021-12-04T03:26:02.078" v="9"/>
+          <ac:spMkLst>
+            <pc:docMk/>
+            <pc:sldMasterMk cId="1137334992" sldId="2147483660"/>
+            <ac:spMk id="6" creationId="{00000000-0000-0000-0000-000000000000}"/>
+          </ac:spMkLst>
+        </pc:spChg>
+        <pc:sldLayoutChg chg="modSp">
+          <pc:chgData name="Bloom PhD, Jesse D" userId="e17e4af4-92ba-4f4f-89d8-f6d4f5501821" providerId="ADAL" clId="{C2A54DA6-4D0B-874D-8794-AC244D64A5BB}" dt="2021-12-04T03:26:02.078" v="9"/>
+          <pc:sldLayoutMkLst>
+            <pc:docMk/>
+            <pc:sldMasterMk cId="1137334992" sldId="2147483660"/>
+            <pc:sldLayoutMk cId="3374963564" sldId="2147483661"/>
+          </pc:sldLayoutMkLst>
+          <pc:spChg chg="mod">
+            <ac:chgData name="Bloom PhD, Jesse D" userId="e17e4af4-92ba-4f4f-89d8-f6d4f5501821" providerId="ADAL" clId="{C2A54DA6-4D0B-874D-8794-AC244D64A5BB}" dt="2021-12-04T03:26:02.078" v="9"/>
+            <ac:spMkLst>
+              <pc:docMk/>
+              <pc:sldMasterMk cId="1137334992" sldId="2147483660"/>
+              <pc:sldLayoutMk cId="3374963564" sldId="2147483661"/>
+              <ac:spMk id="2" creationId="{00000000-0000-0000-0000-000000000000}"/>
+            </ac:spMkLst>
+          </pc:spChg>
+          <pc:spChg chg="mod">
+            <ac:chgData name="Bloom PhD, Jesse D" userId="e17e4af4-92ba-4f4f-89d8-f6d4f5501821" providerId="ADAL" clId="{C2A54DA6-4D0B-874D-8794-AC244D64A5BB}" dt="2021-12-04T03:26:02.078" v="9"/>
+            <ac:spMkLst>
+              <pc:docMk/>
+              <pc:sldMasterMk cId="1137334992" sldId="2147483660"/>
+              <pc:sldLayoutMk cId="3374963564" sldId="2147483661"/>
+              <ac:spMk id="3" creationId="{00000000-0000-0000-0000-000000000000}"/>
+            </ac:spMkLst>
+          </pc:spChg>
+        </pc:sldLayoutChg>
+        <pc:sldLayoutChg chg="modSp">
+          <pc:chgData name="Bloom PhD, Jesse D" userId="e17e4af4-92ba-4f4f-89d8-f6d4f5501821" providerId="ADAL" clId="{C2A54DA6-4D0B-874D-8794-AC244D64A5BB}" dt="2021-12-04T03:26:02.078" v="9"/>
+          <pc:sldLayoutMkLst>
+            <pc:docMk/>
+            <pc:sldMasterMk cId="1137334992" sldId="2147483660"/>
+            <pc:sldLayoutMk cId="252340894" sldId="2147483663"/>
+          </pc:sldLayoutMkLst>
+          <pc:spChg chg="mod">
+            <ac:chgData name="Bloom PhD, Jesse D" userId="e17e4af4-92ba-4f4f-89d8-f6d4f5501821" providerId="ADAL" clId="{C2A54DA6-4D0B-874D-8794-AC244D64A5BB}" dt="2021-12-04T03:26:02.078" v="9"/>
+            <ac:spMkLst>
+              <pc:docMk/>
+              <pc:sldMasterMk cId="1137334992" sldId="2147483660"/>
+              <pc:sldLayoutMk cId="252340894" sldId="2147483663"/>
+              <ac:spMk id="2" creationId="{00000000-0000-0000-0000-000000000000}"/>
+            </ac:spMkLst>
+          </pc:spChg>
+          <pc:spChg chg="mod">
+            <ac:chgData name="Bloom PhD, Jesse D" userId="e17e4af4-92ba-4f4f-89d8-f6d4f5501821" providerId="ADAL" clId="{C2A54DA6-4D0B-874D-8794-AC244D64A5BB}" dt="2021-12-04T03:26:02.078" v="9"/>
+            <ac:spMkLst>
+              <pc:docMk/>
+              <pc:sldMasterMk cId="1137334992" sldId="2147483660"/>
+              <pc:sldLayoutMk cId="252340894" sldId="2147483663"/>
+              <ac:spMk id="3" creationId="{00000000-0000-0000-0000-000000000000}"/>
+            </ac:spMkLst>
+          </pc:spChg>
+        </pc:sldLayoutChg>
+        <pc:sldLayoutChg chg="modSp">
+          <pc:chgData name="Bloom PhD, Jesse D" userId="e17e4af4-92ba-4f4f-89d8-f6d4f5501821" providerId="ADAL" clId="{C2A54DA6-4D0B-874D-8794-AC244D64A5BB}" dt="2021-12-04T03:26:02.078" v="9"/>
+          <pc:sldLayoutMkLst>
+            <pc:docMk/>
+            <pc:sldMasterMk cId="1137334992" sldId="2147483660"/>
+            <pc:sldLayoutMk cId="44394442" sldId="2147483664"/>
+          </pc:sldLayoutMkLst>
+          <pc:spChg chg="mod">
+            <ac:chgData name="Bloom PhD, Jesse D" userId="e17e4af4-92ba-4f4f-89d8-f6d4f5501821" providerId="ADAL" clId="{C2A54DA6-4D0B-874D-8794-AC244D64A5BB}" dt="2021-12-04T03:26:02.078" v="9"/>
+            <ac:spMkLst>
+              <pc:docMk/>
+              <pc:sldMasterMk cId="1137334992" sldId="2147483660"/>
+              <pc:sldLayoutMk cId="44394442" sldId="2147483664"/>
+              <ac:spMk id="3" creationId="{00000000-0000-0000-0000-000000000000}"/>
+            </ac:spMkLst>
+          </pc:spChg>
+          <pc:spChg chg="mod">
+            <ac:chgData name="Bloom PhD, Jesse D" userId="e17e4af4-92ba-4f4f-89d8-f6d4f5501821" providerId="ADAL" clId="{C2A54DA6-4D0B-874D-8794-AC244D64A5BB}" dt="2021-12-04T03:26:02.078" v="9"/>
+            <ac:spMkLst>
+              <pc:docMk/>
+              <pc:sldMasterMk cId="1137334992" sldId="2147483660"/>
+              <pc:sldLayoutMk cId="44394442" sldId="2147483664"/>
+              <ac:spMk id="4" creationId="{00000000-0000-0000-0000-000000000000}"/>
+            </ac:spMkLst>
+          </pc:spChg>
+        </pc:sldLayoutChg>
+        <pc:sldLayoutChg chg="modSp">
+          <pc:chgData name="Bloom PhD, Jesse D" userId="e17e4af4-92ba-4f4f-89d8-f6d4f5501821" providerId="ADAL" clId="{C2A54DA6-4D0B-874D-8794-AC244D64A5BB}" dt="2021-12-04T03:26:02.078" v="9"/>
+          <pc:sldLayoutMkLst>
+            <pc:docMk/>
+            <pc:sldMasterMk cId="1137334992" sldId="2147483660"/>
+            <pc:sldLayoutMk cId="3193904845" sldId="2147483665"/>
+          </pc:sldLayoutMkLst>
+          <pc:spChg chg="mod">
+            <ac:chgData name="Bloom PhD, Jesse D" userId="e17e4af4-92ba-4f4f-89d8-f6d4f5501821" providerId="ADAL" clId="{C2A54DA6-4D0B-874D-8794-AC244D64A5BB}" dt="2021-12-04T03:26:02.078" v="9"/>
+            <ac:spMkLst>
+              <pc:docMk/>
+              <pc:sldMasterMk cId="1137334992" sldId="2147483660"/>
+              <pc:sldLayoutMk cId="3193904845" sldId="2147483665"/>
+              <ac:spMk id="2" creationId="{00000000-0000-0000-0000-000000000000}"/>
+            </ac:spMkLst>
+          </pc:spChg>
+          <pc:spChg chg="mod">
+            <ac:chgData name="Bloom PhD, Jesse D" userId="e17e4af4-92ba-4f4f-89d8-f6d4f5501821" providerId="ADAL" clId="{C2A54DA6-4D0B-874D-8794-AC244D64A5BB}" dt="2021-12-04T03:26:02.078" v="9"/>
+            <ac:spMkLst>
+              <pc:docMk/>
+              <pc:sldMasterMk cId="1137334992" sldId="2147483660"/>
+              <pc:sldLayoutMk cId="3193904845" sldId="2147483665"/>
+              <ac:spMk id="3" creationId="{00000000-0000-0000-0000-000000000000}"/>
+            </ac:spMkLst>
+          </pc:spChg>
+          <pc:spChg chg="mod">
+            <ac:chgData name="Bloom PhD, Jesse D" userId="e17e4af4-92ba-4f4f-89d8-f6d4f5501821" providerId="ADAL" clId="{C2A54DA6-4D0B-874D-8794-AC244D64A5BB}" dt="2021-12-04T03:26:02.078" v="9"/>
+            <ac:spMkLst>
+              <pc:docMk/>
+              <pc:sldMasterMk cId="1137334992" sldId="2147483660"/>
+              <pc:sldLayoutMk cId="3193904845" sldId="2147483665"/>
+              <ac:spMk id="4" creationId="{00000000-0000-0000-0000-000000000000}"/>
+            </ac:spMkLst>
+          </pc:spChg>
+          <pc:spChg chg="mod">
+            <ac:chgData name="Bloom PhD, Jesse D" userId="e17e4af4-92ba-4f4f-89d8-f6d4f5501821" providerId="ADAL" clId="{C2A54DA6-4D0B-874D-8794-AC244D64A5BB}" dt="2021-12-04T03:26:02.078" v="9"/>
+            <ac:spMkLst>
+              <pc:docMk/>
+              <pc:sldMasterMk cId="1137334992" sldId="2147483660"/>
+              <pc:sldLayoutMk cId="3193904845" sldId="2147483665"/>
+              <ac:spMk id="5" creationId="{00000000-0000-0000-0000-000000000000}"/>
+            </ac:spMkLst>
+          </pc:spChg>
+          <pc:spChg chg="mod">
+            <ac:chgData name="Bloom PhD, Jesse D" userId="e17e4af4-92ba-4f4f-89d8-f6d4f5501821" providerId="ADAL" clId="{C2A54DA6-4D0B-874D-8794-AC244D64A5BB}" dt="2021-12-04T03:26:02.078" v="9"/>
+            <ac:spMkLst>
+              <pc:docMk/>
+              <pc:sldMasterMk cId="1137334992" sldId="2147483660"/>
+              <pc:sldLayoutMk cId="3193904845" sldId="2147483665"/>
+              <ac:spMk id="6" creationId="{00000000-0000-0000-0000-000000000000}"/>
+            </ac:spMkLst>
+          </pc:spChg>
+        </pc:sldLayoutChg>
+        <pc:sldLayoutChg chg="modSp">
+          <pc:chgData name="Bloom PhD, Jesse D" userId="e17e4af4-92ba-4f4f-89d8-f6d4f5501821" providerId="ADAL" clId="{C2A54DA6-4D0B-874D-8794-AC244D64A5BB}" dt="2021-12-04T03:26:02.078" v="9"/>
+          <pc:sldLayoutMkLst>
+            <pc:docMk/>
+            <pc:sldMasterMk cId="1137334992" sldId="2147483660"/>
+            <pc:sldLayoutMk cId="2433927905" sldId="2147483668"/>
+          </pc:sldLayoutMkLst>
+          <pc:spChg chg="mod">
+            <ac:chgData name="Bloom PhD, Jesse D" userId="e17e4af4-92ba-4f4f-89d8-f6d4f5501821" providerId="ADAL" clId="{C2A54DA6-4D0B-874D-8794-AC244D64A5BB}" dt="2021-12-04T03:26:02.078" v="9"/>
+            <ac:spMkLst>
+              <pc:docMk/>
+              <pc:sldMasterMk cId="1137334992" sldId="2147483660"/>
+              <pc:sldLayoutMk cId="2433927905" sldId="2147483668"/>
+              <ac:spMk id="2" creationId="{00000000-0000-0000-0000-000000000000}"/>
+            </ac:spMkLst>
+          </pc:spChg>
+          <pc:spChg chg="mod">
+            <ac:chgData name="Bloom PhD, Jesse D" userId="e17e4af4-92ba-4f4f-89d8-f6d4f5501821" providerId="ADAL" clId="{C2A54DA6-4D0B-874D-8794-AC244D64A5BB}" dt="2021-12-04T03:26:02.078" v="9"/>
+            <ac:spMkLst>
+              <pc:docMk/>
+              <pc:sldMasterMk cId="1137334992" sldId="2147483660"/>
+              <pc:sldLayoutMk cId="2433927905" sldId="2147483668"/>
+              <ac:spMk id="3" creationId="{00000000-0000-0000-0000-000000000000}"/>
+            </ac:spMkLst>
+          </pc:spChg>
+          <pc:spChg chg="mod">
+            <ac:chgData name="Bloom PhD, Jesse D" userId="e17e4af4-92ba-4f4f-89d8-f6d4f5501821" providerId="ADAL" clId="{C2A54DA6-4D0B-874D-8794-AC244D64A5BB}" dt="2021-12-04T03:26:02.078" v="9"/>
+            <ac:spMkLst>
+              <pc:docMk/>
+              <pc:sldMasterMk cId="1137334992" sldId="2147483660"/>
+              <pc:sldLayoutMk cId="2433927905" sldId="2147483668"/>
+              <ac:spMk id="4" creationId="{00000000-0000-0000-0000-000000000000}"/>
+            </ac:spMkLst>
+          </pc:spChg>
+        </pc:sldLayoutChg>
+        <pc:sldLayoutChg chg="modSp">
+          <pc:chgData name="Bloom PhD, Jesse D" userId="e17e4af4-92ba-4f4f-89d8-f6d4f5501821" providerId="ADAL" clId="{C2A54DA6-4D0B-874D-8794-AC244D64A5BB}" dt="2021-12-04T03:26:02.078" v="9"/>
+          <pc:sldLayoutMkLst>
+            <pc:docMk/>
+            <pc:sldMasterMk cId="1137334992" sldId="2147483660"/>
+            <pc:sldLayoutMk cId="4009543437" sldId="2147483669"/>
+          </pc:sldLayoutMkLst>
+          <pc:spChg chg="mod">
+            <ac:chgData name="Bloom PhD, Jesse D" userId="e17e4af4-92ba-4f4f-89d8-f6d4f5501821" providerId="ADAL" clId="{C2A54DA6-4D0B-874D-8794-AC244D64A5BB}" dt="2021-12-04T03:26:02.078" v="9"/>
+            <ac:spMkLst>
+              <pc:docMk/>
+              <pc:sldMasterMk cId="1137334992" sldId="2147483660"/>
+              <pc:sldLayoutMk cId="4009543437" sldId="2147483669"/>
+              <ac:spMk id="2" creationId="{00000000-0000-0000-0000-000000000000}"/>
+            </ac:spMkLst>
+          </pc:spChg>
+          <pc:spChg chg="mod">
+            <ac:chgData name="Bloom PhD, Jesse D" userId="e17e4af4-92ba-4f4f-89d8-f6d4f5501821" providerId="ADAL" clId="{C2A54DA6-4D0B-874D-8794-AC244D64A5BB}" dt="2021-12-04T03:26:02.078" v="9"/>
+            <ac:spMkLst>
+              <pc:docMk/>
+              <pc:sldMasterMk cId="1137334992" sldId="2147483660"/>
+              <pc:sldLayoutMk cId="4009543437" sldId="2147483669"/>
+              <ac:spMk id="3" creationId="{00000000-0000-0000-0000-000000000000}"/>
+            </ac:spMkLst>
+          </pc:spChg>
+          <pc:spChg chg="mod">
+            <ac:chgData name="Bloom PhD, Jesse D" userId="e17e4af4-92ba-4f4f-89d8-f6d4f5501821" providerId="ADAL" clId="{C2A54DA6-4D0B-874D-8794-AC244D64A5BB}" dt="2021-12-04T03:26:02.078" v="9"/>
+            <ac:spMkLst>
+              <pc:docMk/>
+              <pc:sldMasterMk cId="1137334992" sldId="2147483660"/>
+              <pc:sldLayoutMk cId="4009543437" sldId="2147483669"/>
+              <ac:spMk id="4" creationId="{00000000-0000-0000-0000-000000000000}"/>
+            </ac:spMkLst>
+          </pc:spChg>
+        </pc:sldLayoutChg>
+        <pc:sldLayoutChg chg="modSp">
+          <pc:chgData name="Bloom PhD, Jesse D" userId="e17e4af4-92ba-4f4f-89d8-f6d4f5501821" providerId="ADAL" clId="{C2A54DA6-4D0B-874D-8794-AC244D64A5BB}" dt="2021-12-04T03:26:02.078" v="9"/>
+          <pc:sldLayoutMkLst>
+            <pc:docMk/>
+            <pc:sldMasterMk cId="1137334992" sldId="2147483660"/>
+            <pc:sldLayoutMk cId="1964455934" sldId="2147483671"/>
+          </pc:sldLayoutMkLst>
+          <pc:spChg chg="mod">
+            <ac:chgData name="Bloom PhD, Jesse D" userId="e17e4af4-92ba-4f4f-89d8-f6d4f5501821" providerId="ADAL" clId="{C2A54DA6-4D0B-874D-8794-AC244D64A5BB}" dt="2021-12-04T03:26:02.078" v="9"/>
+            <ac:spMkLst>
+              <pc:docMk/>
+              <pc:sldMasterMk cId="1137334992" sldId="2147483660"/>
+              <pc:sldLayoutMk cId="1964455934" sldId="2147483671"/>
+              <ac:spMk id="2" creationId="{00000000-0000-0000-0000-000000000000}"/>
+            </ac:spMkLst>
+          </pc:spChg>
+          <pc:spChg chg="mod">
+            <ac:chgData name="Bloom PhD, Jesse D" userId="e17e4af4-92ba-4f4f-89d8-f6d4f5501821" providerId="ADAL" clId="{C2A54DA6-4D0B-874D-8794-AC244D64A5BB}" dt="2021-12-04T03:26:02.078" v="9"/>
+            <ac:spMkLst>
+              <pc:docMk/>
+              <pc:sldMasterMk cId="1137334992" sldId="2147483660"/>
+              <pc:sldLayoutMk cId="1964455934" sldId="2147483671"/>
+              <ac:spMk id="3" creationId="{00000000-0000-0000-0000-000000000000}"/>
+            </ac:spMkLst>
+          </pc:spChg>
+        </pc:sldLayoutChg>
+      </pc:sldMasterChg>
+    </pc:docChg>
+  </pc:docChgLst>
+</pc:chgInfo>
 </file>
 
 <file path=ppt/slideLayouts/slideLayout1.xml><?xml version="1.0" encoding="utf-8"?>
@@ -134,13 +813,7 @@
       </p:grpSpPr>
       <p:sp>
         <p:nvSpPr>
-          <p:cNvPr id="2" name="Title 1">
-            <a:extLst>
-              <a:ext uri="{FF2B5EF4-FFF2-40B4-BE49-F238E27FC236}">
-                <a16:creationId xmlns:a16="http://schemas.microsoft.com/office/drawing/2014/main" id="{16D1DDEB-72F7-FB46-8A56-11F4E6A578D5}"/>
-              </a:ext>
-            </a:extLst>
-          </p:cNvPr>
+          <p:cNvPr id="2" name="Title 1"/>
           <p:cNvSpPr>
             <a:spLocks noGrp="1"/>
           </p:cNvSpPr>
@@ -150,15 +823,15 @@
         </p:nvSpPr>
         <p:spPr>
           <a:xfrm>
-            <a:off x="1524000" y="1122363"/>
-            <a:ext cx="9144000" cy="2387600"/>
+            <a:off x="1524000" y="568716"/>
+            <a:ext cx="9144000" cy="1209828"/>
           </a:xfrm>
         </p:spPr>
         <p:txBody>
           <a:bodyPr anchor="b"/>
           <a:lstStyle>
             <a:lvl1pPr algn="ctr">
-              <a:defRPr sz="6000"/>
+              <a:defRPr sz="3040"/>
             </a:lvl1pPr>
           </a:lstStyle>
           <a:p>
@@ -166,18 +839,13 @@
               <a:rPr lang="en-US"/>
               <a:t>Click to edit Master title style</a:t>
             </a:r>
-          </a:p>
-        </p:txBody>
-      </p:sp>
-      <p:sp>
-        <p:nvSpPr>
-          <p:cNvPr id="3" name="Subtitle 2">
-            <a:extLst>
-              <a:ext uri="{FF2B5EF4-FFF2-40B4-BE49-F238E27FC236}">
-                <a16:creationId xmlns:a16="http://schemas.microsoft.com/office/drawing/2014/main" id="{2BFA771A-FBDD-5B4E-81A5-357F4AE7ACCA}"/>
-              </a:ext>
-            </a:extLst>
-          </p:cNvPr>
+            <a:endParaRPr lang="en-US" dirty="0"/>
+          </a:p>
+        </p:txBody>
+      </p:sp>
+      <p:sp>
+        <p:nvSpPr>
+          <p:cNvPr id="3" name="Subtitle 2"/>
           <p:cNvSpPr>
             <a:spLocks noGrp="1"/>
           </p:cNvSpPr>
@@ -187,8 +855,8 @@
         </p:nvSpPr>
         <p:spPr>
           <a:xfrm>
-            <a:off x="1524000" y="3602038"/>
-            <a:ext cx="9144000" cy="1655762"/>
+            <a:off x="1524000" y="1825200"/>
+            <a:ext cx="9144000" cy="838996"/>
           </a:xfrm>
         </p:spPr>
         <p:txBody>
@@ -196,39 +864,39 @@
           <a:lstStyle>
             <a:lvl1pPr marL="0" indent="0" algn="ctr">
               <a:buNone/>
-              <a:defRPr sz="2400"/>
+              <a:defRPr sz="1216"/>
             </a:lvl1pPr>
-            <a:lvl2pPr marL="457200" indent="0" algn="ctr">
-              <a:buNone/>
-              <a:defRPr sz="2000"/>
+            <a:lvl2pPr marL="231663" indent="0" algn="ctr">
+              <a:buNone/>
+              <a:defRPr sz="1013"/>
             </a:lvl2pPr>
-            <a:lvl3pPr marL="914400" indent="0" algn="ctr">
-              <a:buNone/>
-              <a:defRPr sz="1800"/>
+            <a:lvl3pPr marL="463326" indent="0" algn="ctr">
+              <a:buNone/>
+              <a:defRPr sz="912"/>
             </a:lvl3pPr>
-            <a:lvl4pPr marL="1371600" indent="0" algn="ctr">
-              <a:buNone/>
-              <a:defRPr sz="1600"/>
+            <a:lvl4pPr marL="694990" indent="0" algn="ctr">
+              <a:buNone/>
+              <a:defRPr sz="811"/>
             </a:lvl4pPr>
-            <a:lvl5pPr marL="1828800" indent="0" algn="ctr">
-              <a:buNone/>
-              <a:defRPr sz="1600"/>
+            <a:lvl5pPr marL="926653" indent="0" algn="ctr">
+              <a:buNone/>
+              <a:defRPr sz="811"/>
             </a:lvl5pPr>
-            <a:lvl6pPr marL="2286000" indent="0" algn="ctr">
-              <a:buNone/>
-              <a:defRPr sz="1600"/>
+            <a:lvl6pPr marL="1158316" indent="0" algn="ctr">
+              <a:buNone/>
+              <a:defRPr sz="811"/>
             </a:lvl6pPr>
-            <a:lvl7pPr marL="2743200" indent="0" algn="ctr">
-              <a:buNone/>
-              <a:defRPr sz="1600"/>
+            <a:lvl7pPr marL="1389979" indent="0" algn="ctr">
+              <a:buNone/>
+              <a:defRPr sz="811"/>
             </a:lvl7pPr>
-            <a:lvl8pPr marL="3200400" indent="0" algn="ctr">
-              <a:buNone/>
-              <a:defRPr sz="1600"/>
+            <a:lvl8pPr marL="1621643" indent="0" algn="ctr">
+              <a:buNone/>
+              <a:defRPr sz="811"/>
             </a:lvl8pPr>
-            <a:lvl9pPr marL="3657600" indent="0" algn="ctr">
-              <a:buNone/>
-              <a:defRPr sz="1600"/>
+            <a:lvl9pPr marL="1853306" indent="0" algn="ctr">
+              <a:buNone/>
+              <a:defRPr sz="811"/>
             </a:lvl9pPr>
           </a:lstStyle>
           <a:p>
@@ -236,18 +904,13 @@
               <a:rPr lang="en-US"/>
               <a:t>Click to edit Master subtitle style</a:t>
             </a:r>
-          </a:p>
-        </p:txBody>
-      </p:sp>
-      <p:sp>
-        <p:nvSpPr>
-          <p:cNvPr id="4" name="Date Placeholder 3">
-            <a:extLst>
-              <a:ext uri="{FF2B5EF4-FFF2-40B4-BE49-F238E27FC236}">
-                <a16:creationId xmlns:a16="http://schemas.microsoft.com/office/drawing/2014/main" id="{57BCCA9A-660A-9C42-AB46-D0B3E03D9784}"/>
-              </a:ext>
-            </a:extLst>
-          </p:cNvPr>
+            <a:endParaRPr lang="en-US" dirty="0"/>
+          </a:p>
+        </p:txBody>
+      </p:sp>
+      <p:sp>
+        <p:nvSpPr>
+          <p:cNvPr id="4" name="Date Placeholder 3"/>
           <p:cNvSpPr>
             <a:spLocks noGrp="1"/>
           </p:cNvSpPr>
@@ -270,13 +933,7 @@
       </p:sp>
       <p:sp>
         <p:nvSpPr>
-          <p:cNvPr id="5" name="Footer Placeholder 4">
-            <a:extLst>
-              <a:ext uri="{FF2B5EF4-FFF2-40B4-BE49-F238E27FC236}">
-                <a16:creationId xmlns:a16="http://schemas.microsoft.com/office/drawing/2014/main" id="{D55685AF-5DB6-014C-8592-3EB1D7DCE78B}"/>
-              </a:ext>
-            </a:extLst>
-          </p:cNvPr>
+          <p:cNvPr id="5" name="Footer Placeholder 4"/>
           <p:cNvSpPr>
             <a:spLocks noGrp="1"/>
           </p:cNvSpPr>
@@ -295,13 +952,7 @@
       </p:sp>
       <p:sp>
         <p:nvSpPr>
-          <p:cNvPr id="6" name="Slide Number Placeholder 5">
-            <a:extLst>
-              <a:ext uri="{FF2B5EF4-FFF2-40B4-BE49-F238E27FC236}">
-                <a16:creationId xmlns:a16="http://schemas.microsoft.com/office/drawing/2014/main" id="{41DB72AF-A683-7D4B-BB86-0E5081B401AA}"/>
-              </a:ext>
-            </a:extLst>
-          </p:cNvPr>
+          <p:cNvPr id="6" name="Slide Number Placeholder 5"/>
           <p:cNvSpPr>
             <a:spLocks noGrp="1"/>
           </p:cNvSpPr>
@@ -325,7 +976,7 @@
     </p:spTree>
     <p:extLst>
       <p:ext uri="{BB962C8B-B14F-4D97-AF65-F5344CB8AC3E}">
-        <p14:creationId xmlns:p14="http://schemas.microsoft.com/office/powerpoint/2010/main" val="2134378351"/>
+        <p14:creationId xmlns:p14="http://schemas.microsoft.com/office/powerpoint/2010/main" val="367706980"/>
       </p:ext>
     </p:extLst>
   </p:cSld>
@@ -354,13 +1005,7 @@
       </p:grpSpPr>
       <p:sp>
         <p:nvSpPr>
-          <p:cNvPr id="2" name="Title 1">
-            <a:extLst>
-              <a:ext uri="{FF2B5EF4-FFF2-40B4-BE49-F238E27FC236}">
-                <a16:creationId xmlns:a16="http://schemas.microsoft.com/office/drawing/2014/main" id="{C72775EB-CAF2-D741-9B2B-031A983B252E}"/>
-              </a:ext>
-            </a:extLst>
-          </p:cNvPr>
+          <p:cNvPr id="2" name="Title 1"/>
           <p:cNvSpPr>
             <a:spLocks noGrp="1"/>
           </p:cNvSpPr>
@@ -377,18 +1022,13 @@
               <a:rPr lang="en-US"/>
               <a:t>Click to edit Master title style</a:t>
             </a:r>
-          </a:p>
-        </p:txBody>
-      </p:sp>
-      <p:sp>
-        <p:nvSpPr>
-          <p:cNvPr id="3" name="Vertical Text Placeholder 2">
-            <a:extLst>
-              <a:ext uri="{FF2B5EF4-FFF2-40B4-BE49-F238E27FC236}">
-                <a16:creationId xmlns:a16="http://schemas.microsoft.com/office/drawing/2014/main" id="{448565D6-BDDC-8F44-8812-7A35093AEDA0}"/>
-              </a:ext>
-            </a:extLst>
-          </p:cNvPr>
+            <a:endParaRPr lang="en-US" dirty="0"/>
+          </a:p>
+        </p:txBody>
+      </p:sp>
+      <p:sp>
+        <p:nvSpPr>
+          <p:cNvPr id="3" name="Vertical Text Placeholder 2"/>
           <p:cNvSpPr>
             <a:spLocks noGrp="1"/>
           </p:cNvSpPr>
@@ -434,18 +1074,13 @@
               <a:rPr lang="en-US"/>
               <a:t>Fifth level</a:t>
             </a:r>
-          </a:p>
-        </p:txBody>
-      </p:sp>
-      <p:sp>
-        <p:nvSpPr>
-          <p:cNvPr id="4" name="Date Placeholder 3">
-            <a:extLst>
-              <a:ext uri="{FF2B5EF4-FFF2-40B4-BE49-F238E27FC236}">
-                <a16:creationId xmlns:a16="http://schemas.microsoft.com/office/drawing/2014/main" id="{4C65BDC9-2FBE-EA46-B90D-8208B274FDF5}"/>
-              </a:ext>
-            </a:extLst>
-          </p:cNvPr>
+            <a:endParaRPr lang="en-US" dirty="0"/>
+          </a:p>
+        </p:txBody>
+      </p:sp>
+      <p:sp>
+        <p:nvSpPr>
+          <p:cNvPr id="4" name="Date Placeholder 3"/>
           <p:cNvSpPr>
             <a:spLocks noGrp="1"/>
           </p:cNvSpPr>
@@ -468,13 +1103,7 @@
       </p:sp>
       <p:sp>
         <p:nvSpPr>
-          <p:cNvPr id="5" name="Footer Placeholder 4">
-            <a:extLst>
-              <a:ext uri="{FF2B5EF4-FFF2-40B4-BE49-F238E27FC236}">
-                <a16:creationId xmlns:a16="http://schemas.microsoft.com/office/drawing/2014/main" id="{43B93265-143B-9F45-AD95-69C1B346F462}"/>
-              </a:ext>
-            </a:extLst>
-          </p:cNvPr>
+          <p:cNvPr id="5" name="Footer Placeholder 4"/>
           <p:cNvSpPr>
             <a:spLocks noGrp="1"/>
           </p:cNvSpPr>
@@ -493,13 +1122,7 @@
       </p:sp>
       <p:sp>
         <p:nvSpPr>
-          <p:cNvPr id="6" name="Slide Number Placeholder 5">
-            <a:extLst>
-              <a:ext uri="{FF2B5EF4-FFF2-40B4-BE49-F238E27FC236}">
-                <a16:creationId xmlns:a16="http://schemas.microsoft.com/office/drawing/2014/main" id="{C2C7C552-14DD-5D4E-BB07-286283E6BF78}"/>
-              </a:ext>
-            </a:extLst>
-          </p:cNvPr>
+          <p:cNvPr id="6" name="Slide Number Placeholder 5"/>
           <p:cNvSpPr>
             <a:spLocks noGrp="1"/>
           </p:cNvSpPr>
@@ -523,7 +1146,7 @@
     </p:spTree>
     <p:extLst>
       <p:ext uri="{BB962C8B-B14F-4D97-AF65-F5344CB8AC3E}">
-        <p14:creationId xmlns:p14="http://schemas.microsoft.com/office/powerpoint/2010/main" val="2120138848"/>
+        <p14:creationId xmlns:p14="http://schemas.microsoft.com/office/powerpoint/2010/main" val="2887093817"/>
       </p:ext>
     </p:extLst>
   </p:cSld>
@@ -552,13 +1175,7 @@
       </p:grpSpPr>
       <p:sp>
         <p:nvSpPr>
-          <p:cNvPr id="2" name="Vertical Title 1">
-            <a:extLst>
-              <a:ext uri="{FF2B5EF4-FFF2-40B4-BE49-F238E27FC236}">
-                <a16:creationId xmlns:a16="http://schemas.microsoft.com/office/drawing/2014/main" id="{28F509BA-AEBE-0B44-B1E5-C80324C8F587}"/>
-              </a:ext>
-            </a:extLst>
-          </p:cNvPr>
+          <p:cNvPr id="2" name="Vertical Title 1"/>
           <p:cNvSpPr>
             <a:spLocks noGrp="1"/>
           </p:cNvSpPr>
@@ -568,8 +1185,8 @@
         </p:nvSpPr>
         <p:spPr>
           <a:xfrm>
-            <a:off x="8724900" y="365125"/>
-            <a:ext cx="2628900" cy="5811838"/>
+            <a:off x="8724900" y="185014"/>
+            <a:ext cx="2628900" cy="2944934"/>
           </a:xfrm>
         </p:spPr>
         <p:txBody>
@@ -580,18 +1197,13 @@
               <a:rPr lang="en-US"/>
               <a:t>Click to edit Master title style</a:t>
             </a:r>
-          </a:p>
-        </p:txBody>
-      </p:sp>
-      <p:sp>
-        <p:nvSpPr>
-          <p:cNvPr id="3" name="Vertical Text Placeholder 2">
-            <a:extLst>
-              <a:ext uri="{FF2B5EF4-FFF2-40B4-BE49-F238E27FC236}">
-                <a16:creationId xmlns:a16="http://schemas.microsoft.com/office/drawing/2014/main" id="{244830EB-1F90-CB44-959F-7D90916AAE2D}"/>
-              </a:ext>
-            </a:extLst>
-          </p:cNvPr>
+            <a:endParaRPr lang="en-US" dirty="0"/>
+          </a:p>
+        </p:txBody>
+      </p:sp>
+      <p:sp>
+        <p:nvSpPr>
+          <p:cNvPr id="3" name="Vertical Text Placeholder 2"/>
           <p:cNvSpPr>
             <a:spLocks noGrp="1"/>
           </p:cNvSpPr>
@@ -601,8 +1213,8 @@
         </p:nvSpPr>
         <p:spPr>
           <a:xfrm>
-            <a:off x="838200" y="365125"/>
-            <a:ext cx="7734300" cy="5811838"/>
+            <a:off x="838200" y="185014"/>
+            <a:ext cx="7734300" cy="2944934"/>
           </a:xfrm>
         </p:spPr>
         <p:txBody>
@@ -642,18 +1254,13 @@
               <a:rPr lang="en-US"/>
               <a:t>Fifth level</a:t>
             </a:r>
-          </a:p>
-        </p:txBody>
-      </p:sp>
-      <p:sp>
-        <p:nvSpPr>
-          <p:cNvPr id="4" name="Date Placeholder 3">
-            <a:extLst>
-              <a:ext uri="{FF2B5EF4-FFF2-40B4-BE49-F238E27FC236}">
-                <a16:creationId xmlns:a16="http://schemas.microsoft.com/office/drawing/2014/main" id="{AE697F16-F73B-594B-B630-2FA8D37B9C61}"/>
-              </a:ext>
-            </a:extLst>
-          </p:cNvPr>
+            <a:endParaRPr lang="en-US" dirty="0"/>
+          </a:p>
+        </p:txBody>
+      </p:sp>
+      <p:sp>
+        <p:nvSpPr>
+          <p:cNvPr id="4" name="Date Placeholder 3"/>
           <p:cNvSpPr>
             <a:spLocks noGrp="1"/>
           </p:cNvSpPr>
@@ -676,13 +1283,7 @@
       </p:sp>
       <p:sp>
         <p:nvSpPr>
-          <p:cNvPr id="5" name="Footer Placeholder 4">
-            <a:extLst>
-              <a:ext uri="{FF2B5EF4-FFF2-40B4-BE49-F238E27FC236}">
-                <a16:creationId xmlns:a16="http://schemas.microsoft.com/office/drawing/2014/main" id="{EF5A181E-0AFD-0043-A0A8-B1E48776D718}"/>
-              </a:ext>
-            </a:extLst>
-          </p:cNvPr>
+          <p:cNvPr id="5" name="Footer Placeholder 4"/>
           <p:cNvSpPr>
             <a:spLocks noGrp="1"/>
           </p:cNvSpPr>
@@ -701,13 +1302,7 @@
       </p:sp>
       <p:sp>
         <p:nvSpPr>
-          <p:cNvPr id="6" name="Slide Number Placeholder 5">
-            <a:extLst>
-              <a:ext uri="{FF2B5EF4-FFF2-40B4-BE49-F238E27FC236}">
-                <a16:creationId xmlns:a16="http://schemas.microsoft.com/office/drawing/2014/main" id="{0197EC6F-7F7F-A245-82A0-D370EF2D5E04}"/>
-              </a:ext>
-            </a:extLst>
-          </p:cNvPr>
+          <p:cNvPr id="6" name="Slide Number Placeholder 5"/>
           <p:cNvSpPr>
             <a:spLocks noGrp="1"/>
           </p:cNvSpPr>
@@ -731,7 +1326,7 @@
     </p:spTree>
     <p:extLst>
       <p:ext uri="{BB962C8B-B14F-4D97-AF65-F5344CB8AC3E}">
-        <p14:creationId xmlns:p14="http://schemas.microsoft.com/office/powerpoint/2010/main" val="3038537464"/>
+        <p14:creationId xmlns:p14="http://schemas.microsoft.com/office/powerpoint/2010/main" val="4237598644"/>
       </p:ext>
     </p:extLst>
   </p:cSld>
@@ -760,13 +1355,7 @@
       </p:grpSpPr>
       <p:sp>
         <p:nvSpPr>
-          <p:cNvPr id="2" name="Title 1">
-            <a:extLst>
-              <a:ext uri="{FF2B5EF4-FFF2-40B4-BE49-F238E27FC236}">
-                <a16:creationId xmlns:a16="http://schemas.microsoft.com/office/drawing/2014/main" id="{4BFED3F1-CCC1-114E-ABB7-513B82F0EF50}"/>
-              </a:ext>
-            </a:extLst>
-          </p:cNvPr>
+          <p:cNvPr id="2" name="Title 1"/>
           <p:cNvSpPr>
             <a:spLocks noGrp="1"/>
           </p:cNvSpPr>
@@ -783,18 +1372,13 @@
               <a:rPr lang="en-US"/>
               <a:t>Click to edit Master title style</a:t>
             </a:r>
-          </a:p>
-        </p:txBody>
-      </p:sp>
-      <p:sp>
-        <p:nvSpPr>
-          <p:cNvPr id="3" name="Content Placeholder 2">
-            <a:extLst>
-              <a:ext uri="{FF2B5EF4-FFF2-40B4-BE49-F238E27FC236}">
-                <a16:creationId xmlns:a16="http://schemas.microsoft.com/office/drawing/2014/main" id="{CE8E297C-8319-BD4D-BC70-E9F28D6034D4}"/>
-              </a:ext>
-            </a:extLst>
-          </p:cNvPr>
+            <a:endParaRPr lang="en-US" dirty="0"/>
+          </a:p>
+        </p:txBody>
+      </p:sp>
+      <p:sp>
+        <p:nvSpPr>
+          <p:cNvPr id="3" name="Content Placeholder 2"/>
           <p:cNvSpPr>
             <a:spLocks noGrp="1"/>
           </p:cNvSpPr>
@@ -840,18 +1424,13 @@
               <a:rPr lang="en-US"/>
               <a:t>Fifth level</a:t>
             </a:r>
-          </a:p>
-        </p:txBody>
-      </p:sp>
-      <p:sp>
-        <p:nvSpPr>
-          <p:cNvPr id="4" name="Date Placeholder 3">
-            <a:extLst>
-              <a:ext uri="{FF2B5EF4-FFF2-40B4-BE49-F238E27FC236}">
-                <a16:creationId xmlns:a16="http://schemas.microsoft.com/office/drawing/2014/main" id="{5B97E6A9-A577-824C-AA07-B53E623067E8}"/>
-              </a:ext>
-            </a:extLst>
-          </p:cNvPr>
+            <a:endParaRPr lang="en-US" dirty="0"/>
+          </a:p>
+        </p:txBody>
+      </p:sp>
+      <p:sp>
+        <p:nvSpPr>
+          <p:cNvPr id="4" name="Date Placeholder 3"/>
           <p:cNvSpPr>
             <a:spLocks noGrp="1"/>
           </p:cNvSpPr>
@@ -874,13 +1453,7 @@
       </p:sp>
       <p:sp>
         <p:nvSpPr>
-          <p:cNvPr id="5" name="Footer Placeholder 4">
-            <a:extLst>
-              <a:ext uri="{FF2B5EF4-FFF2-40B4-BE49-F238E27FC236}">
-                <a16:creationId xmlns:a16="http://schemas.microsoft.com/office/drawing/2014/main" id="{1A7CE9C2-7AD8-E04B-A9A1-AF0737293AE0}"/>
-              </a:ext>
-            </a:extLst>
-          </p:cNvPr>
+          <p:cNvPr id="5" name="Footer Placeholder 4"/>
           <p:cNvSpPr>
             <a:spLocks noGrp="1"/>
           </p:cNvSpPr>
@@ -899,13 +1472,7 @@
       </p:sp>
       <p:sp>
         <p:nvSpPr>
-          <p:cNvPr id="6" name="Slide Number Placeholder 5">
-            <a:extLst>
-              <a:ext uri="{FF2B5EF4-FFF2-40B4-BE49-F238E27FC236}">
-                <a16:creationId xmlns:a16="http://schemas.microsoft.com/office/drawing/2014/main" id="{AF51C860-0E30-0042-BA63-B042194EB893}"/>
-              </a:ext>
-            </a:extLst>
-          </p:cNvPr>
+          <p:cNvPr id="6" name="Slide Number Placeholder 5"/>
           <p:cNvSpPr>
             <a:spLocks noGrp="1"/>
           </p:cNvSpPr>
@@ -929,7 +1496,7 @@
     </p:spTree>
     <p:extLst>
       <p:ext uri="{BB962C8B-B14F-4D97-AF65-F5344CB8AC3E}">
-        <p14:creationId xmlns:p14="http://schemas.microsoft.com/office/powerpoint/2010/main" val="2962737910"/>
+        <p14:creationId xmlns:p14="http://schemas.microsoft.com/office/powerpoint/2010/main" val="248876553"/>
       </p:ext>
     </p:extLst>
   </p:cSld>
@@ -958,13 +1525,7 @@
       </p:grpSpPr>
       <p:sp>
         <p:nvSpPr>
-          <p:cNvPr id="2" name="Title 1">
-            <a:extLst>
-              <a:ext uri="{FF2B5EF4-FFF2-40B4-BE49-F238E27FC236}">
-                <a16:creationId xmlns:a16="http://schemas.microsoft.com/office/drawing/2014/main" id="{B2484988-6B20-5144-ABBA-F3DE5C200D24}"/>
-              </a:ext>
-            </a:extLst>
-          </p:cNvPr>
+          <p:cNvPr id="2" name="Title 1"/>
           <p:cNvSpPr>
             <a:spLocks noGrp="1"/>
           </p:cNvSpPr>
@@ -974,15 +1535,15 @@
         </p:nvSpPr>
         <p:spPr>
           <a:xfrm>
-            <a:off x="831850" y="1709738"/>
-            <a:ext cx="10515600" cy="2852737"/>
+            <a:off x="831850" y="866347"/>
+            <a:ext cx="10515600" cy="1445519"/>
           </a:xfrm>
         </p:spPr>
         <p:txBody>
           <a:bodyPr anchor="b"/>
           <a:lstStyle>
             <a:lvl1pPr>
-              <a:defRPr sz="6000"/>
+              <a:defRPr sz="3040"/>
             </a:lvl1pPr>
           </a:lstStyle>
           <a:p>
@@ -990,18 +1551,13 @@
               <a:rPr lang="en-US"/>
               <a:t>Click to edit Master title style</a:t>
             </a:r>
-          </a:p>
-        </p:txBody>
-      </p:sp>
-      <p:sp>
-        <p:nvSpPr>
-          <p:cNvPr id="3" name="Text Placeholder 2">
-            <a:extLst>
-              <a:ext uri="{FF2B5EF4-FFF2-40B4-BE49-F238E27FC236}">
-                <a16:creationId xmlns:a16="http://schemas.microsoft.com/office/drawing/2014/main" id="{4B23ECE6-D45F-F447-8AFB-60637FBE2A8A}"/>
-              </a:ext>
-            </a:extLst>
-          </p:cNvPr>
+            <a:endParaRPr lang="en-US" dirty="0"/>
+          </a:p>
+        </p:txBody>
+      </p:sp>
+      <p:sp>
+        <p:nvSpPr>
+          <p:cNvPr id="3" name="Text Placeholder 2"/>
           <p:cNvSpPr>
             <a:spLocks noGrp="1"/>
           </p:cNvSpPr>
@@ -1011,8 +1567,8 @@
         </p:nvSpPr>
         <p:spPr>
           <a:xfrm>
-            <a:off x="831850" y="4589463"/>
-            <a:ext cx="10515600" cy="1500187"/>
+            <a:off x="831850" y="2325541"/>
+            <a:ext cx="10515600" cy="760164"/>
           </a:xfrm>
         </p:spPr>
         <p:txBody>
@@ -1020,7 +1576,7 @@
           <a:lstStyle>
             <a:lvl1pPr marL="0" indent="0">
               <a:buNone/>
-              <a:defRPr sz="2400">
+              <a:defRPr sz="1216">
                 <a:solidFill>
                   <a:schemeClr val="tx1">
                     <a:tint val="75000"/>
@@ -1028,9 +1584,9 @@
                 </a:solidFill>
               </a:defRPr>
             </a:lvl1pPr>
-            <a:lvl2pPr marL="457200" indent="0">
-              <a:buNone/>
-              <a:defRPr sz="2000">
+            <a:lvl2pPr marL="231663" indent="0">
+              <a:buNone/>
+              <a:defRPr sz="1013">
                 <a:solidFill>
                   <a:schemeClr val="tx1">
                     <a:tint val="75000"/>
@@ -1038,9 +1594,9 @@
                 </a:solidFill>
               </a:defRPr>
             </a:lvl2pPr>
-            <a:lvl3pPr marL="914400" indent="0">
-              <a:buNone/>
-              <a:defRPr sz="1800">
+            <a:lvl3pPr marL="463326" indent="0">
+              <a:buNone/>
+              <a:defRPr sz="912">
                 <a:solidFill>
                   <a:schemeClr val="tx1">
                     <a:tint val="75000"/>
@@ -1048,9 +1604,9 @@
                 </a:solidFill>
               </a:defRPr>
             </a:lvl3pPr>
-            <a:lvl4pPr marL="1371600" indent="0">
-              <a:buNone/>
-              <a:defRPr sz="1600">
+            <a:lvl4pPr marL="694990" indent="0">
+              <a:buNone/>
+              <a:defRPr sz="811">
                 <a:solidFill>
                   <a:schemeClr val="tx1">
                     <a:tint val="75000"/>
@@ -1058,9 +1614,9 @@
                 </a:solidFill>
               </a:defRPr>
             </a:lvl4pPr>
-            <a:lvl5pPr marL="1828800" indent="0">
-              <a:buNone/>
-              <a:defRPr sz="1600">
+            <a:lvl5pPr marL="926653" indent="0">
+              <a:buNone/>
+              <a:defRPr sz="811">
                 <a:solidFill>
                   <a:schemeClr val="tx1">
                     <a:tint val="75000"/>
@@ -1068,9 +1624,9 @@
                 </a:solidFill>
               </a:defRPr>
             </a:lvl5pPr>
-            <a:lvl6pPr marL="2286000" indent="0">
-              <a:buNone/>
-              <a:defRPr sz="1600">
+            <a:lvl6pPr marL="1158316" indent="0">
+              <a:buNone/>
+              <a:defRPr sz="811">
                 <a:solidFill>
                   <a:schemeClr val="tx1">
                     <a:tint val="75000"/>
@@ -1078,9 +1634,9 @@
                 </a:solidFill>
               </a:defRPr>
             </a:lvl6pPr>
-            <a:lvl7pPr marL="2743200" indent="0">
-              <a:buNone/>
-              <a:defRPr sz="1600">
+            <a:lvl7pPr marL="1389979" indent="0">
+              <a:buNone/>
+              <a:defRPr sz="811">
                 <a:solidFill>
                   <a:schemeClr val="tx1">
                     <a:tint val="75000"/>
@@ -1088,9 +1644,9 @@
                 </a:solidFill>
               </a:defRPr>
             </a:lvl7pPr>
-            <a:lvl8pPr marL="3200400" indent="0">
-              <a:buNone/>
-              <a:defRPr sz="1600">
+            <a:lvl8pPr marL="1621643" indent="0">
+              <a:buNone/>
+              <a:defRPr sz="811">
                 <a:solidFill>
                   <a:schemeClr val="tx1">
                     <a:tint val="75000"/>
@@ -1098,9 +1654,9 @@
                 </a:solidFill>
               </a:defRPr>
             </a:lvl8pPr>
-            <a:lvl9pPr marL="3657600" indent="0">
-              <a:buNone/>
-              <a:defRPr sz="1600">
+            <a:lvl9pPr marL="1853306" indent="0">
+              <a:buNone/>
+              <a:defRPr sz="811">
                 <a:solidFill>
                   <a:schemeClr val="tx1">
                     <a:tint val="75000"/>
@@ -1120,13 +1676,7 @@
       </p:sp>
       <p:sp>
         <p:nvSpPr>
-          <p:cNvPr id="4" name="Date Placeholder 3">
-            <a:extLst>
-              <a:ext uri="{FF2B5EF4-FFF2-40B4-BE49-F238E27FC236}">
-                <a16:creationId xmlns:a16="http://schemas.microsoft.com/office/drawing/2014/main" id="{8C674ADE-08BB-1E43-A441-56A7A0A25A7A}"/>
-              </a:ext>
-            </a:extLst>
-          </p:cNvPr>
+          <p:cNvPr id="4" name="Date Placeholder 3"/>
           <p:cNvSpPr>
             <a:spLocks noGrp="1"/>
           </p:cNvSpPr>
@@ -1149,13 +1699,7 @@
       </p:sp>
       <p:sp>
         <p:nvSpPr>
-          <p:cNvPr id="5" name="Footer Placeholder 4">
-            <a:extLst>
-              <a:ext uri="{FF2B5EF4-FFF2-40B4-BE49-F238E27FC236}">
-                <a16:creationId xmlns:a16="http://schemas.microsoft.com/office/drawing/2014/main" id="{CAE0E4B1-1FC1-7C40-8F2E-FEC93E7FD0FA}"/>
-              </a:ext>
-            </a:extLst>
-          </p:cNvPr>
+          <p:cNvPr id="5" name="Footer Placeholder 4"/>
           <p:cNvSpPr>
             <a:spLocks noGrp="1"/>
           </p:cNvSpPr>
@@ -1174,13 +1718,7 @@
       </p:sp>
       <p:sp>
         <p:nvSpPr>
-          <p:cNvPr id="6" name="Slide Number Placeholder 5">
-            <a:extLst>
-              <a:ext uri="{FF2B5EF4-FFF2-40B4-BE49-F238E27FC236}">
-                <a16:creationId xmlns:a16="http://schemas.microsoft.com/office/drawing/2014/main" id="{405BF236-656D-2841-94D5-7D014FFA75AA}"/>
-              </a:ext>
-            </a:extLst>
-          </p:cNvPr>
+          <p:cNvPr id="6" name="Slide Number Placeholder 5"/>
           <p:cNvSpPr>
             <a:spLocks noGrp="1"/>
           </p:cNvSpPr>
@@ -1204,7 +1742,7 @@
     </p:spTree>
     <p:extLst>
       <p:ext uri="{BB962C8B-B14F-4D97-AF65-F5344CB8AC3E}">
-        <p14:creationId xmlns:p14="http://schemas.microsoft.com/office/powerpoint/2010/main" val="2133098213"/>
+        <p14:creationId xmlns:p14="http://schemas.microsoft.com/office/powerpoint/2010/main" val="870045426"/>
       </p:ext>
     </p:extLst>
   </p:cSld>
@@ -1233,13 +1771,7 @@
       </p:grpSpPr>
       <p:sp>
         <p:nvSpPr>
-          <p:cNvPr id="2" name="Title 1">
-            <a:extLst>
-              <a:ext uri="{FF2B5EF4-FFF2-40B4-BE49-F238E27FC236}">
-                <a16:creationId xmlns:a16="http://schemas.microsoft.com/office/drawing/2014/main" id="{F5B4F12A-108A-3F4E-8F75-DD0D9D92BF70}"/>
-              </a:ext>
-            </a:extLst>
-          </p:cNvPr>
+          <p:cNvPr id="2" name="Title 1"/>
           <p:cNvSpPr>
             <a:spLocks noGrp="1"/>
           </p:cNvSpPr>
@@ -1256,18 +1788,13 @@
               <a:rPr lang="en-US"/>
               <a:t>Click to edit Master title style</a:t>
             </a:r>
-          </a:p>
-        </p:txBody>
-      </p:sp>
-      <p:sp>
-        <p:nvSpPr>
-          <p:cNvPr id="3" name="Content Placeholder 2">
-            <a:extLst>
-              <a:ext uri="{FF2B5EF4-FFF2-40B4-BE49-F238E27FC236}">
-                <a16:creationId xmlns:a16="http://schemas.microsoft.com/office/drawing/2014/main" id="{FBC79DBB-60D1-BD4D-B56F-4C1BF17912C8}"/>
-              </a:ext>
-            </a:extLst>
-          </p:cNvPr>
+            <a:endParaRPr lang="en-US" dirty="0"/>
+          </a:p>
+        </p:txBody>
+      </p:sp>
+      <p:sp>
+        <p:nvSpPr>
+          <p:cNvPr id="3" name="Content Placeholder 2"/>
           <p:cNvSpPr>
             <a:spLocks noGrp="1"/>
           </p:cNvSpPr>
@@ -1277,8 +1804,8 @@
         </p:nvSpPr>
         <p:spPr>
           <a:xfrm>
-            <a:off x="838200" y="1825625"/>
-            <a:ext cx="5181600" cy="4351338"/>
+            <a:off x="838200" y="925068"/>
+            <a:ext cx="5181600" cy="2204880"/>
           </a:xfrm>
         </p:spPr>
         <p:txBody>
@@ -1318,18 +1845,13 @@
               <a:rPr lang="en-US"/>
               <a:t>Fifth level</a:t>
             </a:r>
-          </a:p>
-        </p:txBody>
-      </p:sp>
-      <p:sp>
-        <p:nvSpPr>
-          <p:cNvPr id="4" name="Content Placeholder 3">
-            <a:extLst>
-              <a:ext uri="{FF2B5EF4-FFF2-40B4-BE49-F238E27FC236}">
-                <a16:creationId xmlns:a16="http://schemas.microsoft.com/office/drawing/2014/main" id="{7E574347-F057-B54B-A05F-0234314EFA67}"/>
-              </a:ext>
-            </a:extLst>
-          </p:cNvPr>
+            <a:endParaRPr lang="en-US" dirty="0"/>
+          </a:p>
+        </p:txBody>
+      </p:sp>
+      <p:sp>
+        <p:nvSpPr>
+          <p:cNvPr id="4" name="Content Placeholder 3"/>
           <p:cNvSpPr>
             <a:spLocks noGrp="1"/>
           </p:cNvSpPr>
@@ -1339,8 +1861,8 @@
         </p:nvSpPr>
         <p:spPr>
           <a:xfrm>
-            <a:off x="6172200" y="1825625"/>
-            <a:ext cx="5181600" cy="4351338"/>
+            <a:off x="6172200" y="925068"/>
+            <a:ext cx="5181600" cy="2204880"/>
           </a:xfrm>
         </p:spPr>
         <p:txBody>
@@ -1380,18 +1902,13 @@
               <a:rPr lang="en-US"/>
               <a:t>Fifth level</a:t>
             </a:r>
-          </a:p>
-        </p:txBody>
-      </p:sp>
-      <p:sp>
-        <p:nvSpPr>
-          <p:cNvPr id="5" name="Date Placeholder 4">
-            <a:extLst>
-              <a:ext uri="{FF2B5EF4-FFF2-40B4-BE49-F238E27FC236}">
-                <a16:creationId xmlns:a16="http://schemas.microsoft.com/office/drawing/2014/main" id="{E1968D9E-20E0-B34D-9FB7-8920DCF30CAD}"/>
-              </a:ext>
-            </a:extLst>
-          </p:cNvPr>
+            <a:endParaRPr lang="en-US" dirty="0"/>
+          </a:p>
+        </p:txBody>
+      </p:sp>
+      <p:sp>
+        <p:nvSpPr>
+          <p:cNvPr id="5" name="Date Placeholder 4"/>
           <p:cNvSpPr>
             <a:spLocks noGrp="1"/>
           </p:cNvSpPr>
@@ -1414,13 +1931,7 @@
       </p:sp>
       <p:sp>
         <p:nvSpPr>
-          <p:cNvPr id="6" name="Footer Placeholder 5">
-            <a:extLst>
-              <a:ext uri="{FF2B5EF4-FFF2-40B4-BE49-F238E27FC236}">
-                <a16:creationId xmlns:a16="http://schemas.microsoft.com/office/drawing/2014/main" id="{0D612EF3-7380-2D46-B7D2-5EEA95384B60}"/>
-              </a:ext>
-            </a:extLst>
-          </p:cNvPr>
+          <p:cNvPr id="6" name="Footer Placeholder 5"/>
           <p:cNvSpPr>
             <a:spLocks noGrp="1"/>
           </p:cNvSpPr>
@@ -1439,13 +1950,7 @@
       </p:sp>
       <p:sp>
         <p:nvSpPr>
-          <p:cNvPr id="7" name="Slide Number Placeholder 6">
-            <a:extLst>
-              <a:ext uri="{FF2B5EF4-FFF2-40B4-BE49-F238E27FC236}">
-                <a16:creationId xmlns:a16="http://schemas.microsoft.com/office/drawing/2014/main" id="{26B9645E-3811-E444-A767-3697F5D0BD42}"/>
-              </a:ext>
-            </a:extLst>
-          </p:cNvPr>
+          <p:cNvPr id="7" name="Slide Number Placeholder 6"/>
           <p:cNvSpPr>
             <a:spLocks noGrp="1"/>
           </p:cNvSpPr>
@@ -1469,7 +1974,7 @@
     </p:spTree>
     <p:extLst>
       <p:ext uri="{BB962C8B-B14F-4D97-AF65-F5344CB8AC3E}">
-        <p14:creationId xmlns:p14="http://schemas.microsoft.com/office/powerpoint/2010/main" val="2735122962"/>
+        <p14:creationId xmlns:p14="http://schemas.microsoft.com/office/powerpoint/2010/main" val="4109995762"/>
       </p:ext>
     </p:extLst>
   </p:cSld>
@@ -1498,13 +2003,7 @@
       </p:grpSpPr>
       <p:sp>
         <p:nvSpPr>
-          <p:cNvPr id="2" name="Title 1">
-            <a:extLst>
-              <a:ext uri="{FF2B5EF4-FFF2-40B4-BE49-F238E27FC236}">
-                <a16:creationId xmlns:a16="http://schemas.microsoft.com/office/drawing/2014/main" id="{6073CEF2-F156-8F40-833F-4F93305E3F2A}"/>
-              </a:ext>
-            </a:extLst>
-          </p:cNvPr>
+          <p:cNvPr id="2" name="Title 1"/>
           <p:cNvSpPr>
             <a:spLocks noGrp="1"/>
           </p:cNvSpPr>
@@ -1514,8 +2013,8 @@
         </p:nvSpPr>
         <p:spPr>
           <a:xfrm>
-            <a:off x="839788" y="365125"/>
-            <a:ext cx="10515600" cy="1325563"/>
+            <a:off x="839788" y="185014"/>
+            <a:ext cx="10515600" cy="671680"/>
           </a:xfrm>
         </p:spPr>
         <p:txBody>
@@ -1526,18 +2025,13 @@
               <a:rPr lang="en-US"/>
               <a:t>Click to edit Master title style</a:t>
             </a:r>
-          </a:p>
-        </p:txBody>
-      </p:sp>
-      <p:sp>
-        <p:nvSpPr>
-          <p:cNvPr id="3" name="Text Placeholder 2">
-            <a:extLst>
-              <a:ext uri="{FF2B5EF4-FFF2-40B4-BE49-F238E27FC236}">
-                <a16:creationId xmlns:a16="http://schemas.microsoft.com/office/drawing/2014/main" id="{FD12C90C-08BE-2C45-8B3E-9503983B20FB}"/>
-              </a:ext>
-            </a:extLst>
-          </p:cNvPr>
+            <a:endParaRPr lang="en-US" dirty="0"/>
+          </a:p>
+        </p:txBody>
+      </p:sp>
+      <p:sp>
+        <p:nvSpPr>
+          <p:cNvPr id="3" name="Text Placeholder 2"/>
           <p:cNvSpPr>
             <a:spLocks noGrp="1"/>
           </p:cNvSpPr>
@@ -1547,8 +2041,8 @@
         </p:nvSpPr>
         <p:spPr>
           <a:xfrm>
-            <a:off x="839788" y="1681163"/>
-            <a:ext cx="5157787" cy="823912"/>
+            <a:off x="839789" y="851867"/>
+            <a:ext cx="5157787" cy="417487"/>
           </a:xfrm>
         </p:spPr>
         <p:txBody>
@@ -1556,39 +2050,39 @@
           <a:lstStyle>
             <a:lvl1pPr marL="0" indent="0">
               <a:buNone/>
-              <a:defRPr sz="2400" b="1"/>
+              <a:defRPr sz="1216" b="1"/>
             </a:lvl1pPr>
-            <a:lvl2pPr marL="457200" indent="0">
-              <a:buNone/>
-              <a:defRPr sz="2000" b="1"/>
+            <a:lvl2pPr marL="231663" indent="0">
+              <a:buNone/>
+              <a:defRPr sz="1013" b="1"/>
             </a:lvl2pPr>
-            <a:lvl3pPr marL="914400" indent="0">
-              <a:buNone/>
-              <a:defRPr sz="1800" b="1"/>
+            <a:lvl3pPr marL="463326" indent="0">
+              <a:buNone/>
+              <a:defRPr sz="912" b="1"/>
             </a:lvl3pPr>
-            <a:lvl4pPr marL="1371600" indent="0">
-              <a:buNone/>
-              <a:defRPr sz="1600" b="1"/>
+            <a:lvl4pPr marL="694990" indent="0">
+              <a:buNone/>
+              <a:defRPr sz="811" b="1"/>
             </a:lvl4pPr>
-            <a:lvl5pPr marL="1828800" indent="0">
-              <a:buNone/>
-              <a:defRPr sz="1600" b="1"/>
+            <a:lvl5pPr marL="926653" indent="0">
+              <a:buNone/>
+              <a:defRPr sz="811" b="1"/>
             </a:lvl5pPr>
-            <a:lvl6pPr marL="2286000" indent="0">
-              <a:buNone/>
-              <a:defRPr sz="1600" b="1"/>
+            <a:lvl6pPr marL="1158316" indent="0">
+              <a:buNone/>
+              <a:defRPr sz="811" b="1"/>
             </a:lvl6pPr>
-            <a:lvl7pPr marL="2743200" indent="0">
-              <a:buNone/>
-              <a:defRPr sz="1600" b="1"/>
+            <a:lvl7pPr marL="1389979" indent="0">
+              <a:buNone/>
+              <a:defRPr sz="811" b="1"/>
             </a:lvl7pPr>
-            <a:lvl8pPr marL="3200400" indent="0">
-              <a:buNone/>
-              <a:defRPr sz="1600" b="1"/>
+            <a:lvl8pPr marL="1621643" indent="0">
+              <a:buNone/>
+              <a:defRPr sz="811" b="1"/>
             </a:lvl8pPr>
-            <a:lvl9pPr marL="3657600" indent="0">
-              <a:buNone/>
-              <a:defRPr sz="1600" b="1"/>
+            <a:lvl9pPr marL="1853306" indent="0">
+              <a:buNone/>
+              <a:defRPr sz="811" b="1"/>
             </a:lvl9pPr>
           </a:lstStyle>
           <a:p>
@@ -1602,13 +2096,7 @@
       </p:sp>
       <p:sp>
         <p:nvSpPr>
-          <p:cNvPr id="4" name="Content Placeholder 3">
-            <a:extLst>
-              <a:ext uri="{FF2B5EF4-FFF2-40B4-BE49-F238E27FC236}">
-                <a16:creationId xmlns:a16="http://schemas.microsoft.com/office/drawing/2014/main" id="{925F546B-B3EB-8845-8282-CD58DF142FB5}"/>
-              </a:ext>
-            </a:extLst>
-          </p:cNvPr>
+          <p:cNvPr id="4" name="Content Placeholder 3"/>
           <p:cNvSpPr>
             <a:spLocks noGrp="1"/>
           </p:cNvSpPr>
@@ -1618,8 +2106,8 @@
         </p:nvSpPr>
         <p:spPr>
           <a:xfrm>
-            <a:off x="839788" y="2505075"/>
-            <a:ext cx="5157787" cy="3684588"/>
+            <a:off x="839789" y="1269354"/>
+            <a:ext cx="5157787" cy="1867029"/>
           </a:xfrm>
         </p:spPr>
         <p:txBody>
@@ -1659,18 +2147,13 @@
               <a:rPr lang="en-US"/>
               <a:t>Fifth level</a:t>
             </a:r>
-          </a:p>
-        </p:txBody>
-      </p:sp>
-      <p:sp>
-        <p:nvSpPr>
-          <p:cNvPr id="5" name="Text Placeholder 4">
-            <a:extLst>
-              <a:ext uri="{FF2B5EF4-FFF2-40B4-BE49-F238E27FC236}">
-                <a16:creationId xmlns:a16="http://schemas.microsoft.com/office/drawing/2014/main" id="{914B08C9-DC60-6343-A991-F329760BD845}"/>
-              </a:ext>
-            </a:extLst>
-          </p:cNvPr>
+            <a:endParaRPr lang="en-US" dirty="0"/>
+          </a:p>
+        </p:txBody>
+      </p:sp>
+      <p:sp>
+        <p:nvSpPr>
+          <p:cNvPr id="5" name="Text Placeholder 4"/>
           <p:cNvSpPr>
             <a:spLocks noGrp="1"/>
           </p:cNvSpPr>
@@ -1680,8 +2163,8 @@
         </p:nvSpPr>
         <p:spPr>
           <a:xfrm>
-            <a:off x="6172200" y="1681163"/>
-            <a:ext cx="5183188" cy="823912"/>
+            <a:off x="6172200" y="851867"/>
+            <a:ext cx="5183188" cy="417487"/>
           </a:xfrm>
         </p:spPr>
         <p:txBody>
@@ -1689,39 +2172,39 @@
           <a:lstStyle>
             <a:lvl1pPr marL="0" indent="0">
               <a:buNone/>
-              <a:defRPr sz="2400" b="1"/>
+              <a:defRPr sz="1216" b="1"/>
             </a:lvl1pPr>
-            <a:lvl2pPr marL="457200" indent="0">
-              <a:buNone/>
-              <a:defRPr sz="2000" b="1"/>
+            <a:lvl2pPr marL="231663" indent="0">
+              <a:buNone/>
+              <a:defRPr sz="1013" b="1"/>
             </a:lvl2pPr>
-            <a:lvl3pPr marL="914400" indent="0">
-              <a:buNone/>
-              <a:defRPr sz="1800" b="1"/>
+            <a:lvl3pPr marL="463326" indent="0">
+              <a:buNone/>
+              <a:defRPr sz="912" b="1"/>
             </a:lvl3pPr>
-            <a:lvl4pPr marL="1371600" indent="0">
-              <a:buNone/>
-              <a:defRPr sz="1600" b="1"/>
+            <a:lvl4pPr marL="694990" indent="0">
+              <a:buNone/>
+              <a:defRPr sz="811" b="1"/>
             </a:lvl4pPr>
-            <a:lvl5pPr marL="1828800" indent="0">
-              <a:buNone/>
-              <a:defRPr sz="1600" b="1"/>
+            <a:lvl5pPr marL="926653" indent="0">
+              <a:buNone/>
+              <a:defRPr sz="811" b="1"/>
             </a:lvl5pPr>
-            <a:lvl6pPr marL="2286000" indent="0">
-              <a:buNone/>
-              <a:defRPr sz="1600" b="1"/>
+            <a:lvl6pPr marL="1158316" indent="0">
+              <a:buNone/>
+              <a:defRPr sz="811" b="1"/>
             </a:lvl6pPr>
-            <a:lvl7pPr marL="2743200" indent="0">
-              <a:buNone/>
-              <a:defRPr sz="1600" b="1"/>
+            <a:lvl7pPr marL="1389979" indent="0">
+              <a:buNone/>
+              <a:defRPr sz="811" b="1"/>
             </a:lvl7pPr>
-            <a:lvl8pPr marL="3200400" indent="0">
-              <a:buNone/>
-              <a:defRPr sz="1600" b="1"/>
+            <a:lvl8pPr marL="1621643" indent="0">
+              <a:buNone/>
+              <a:defRPr sz="811" b="1"/>
             </a:lvl8pPr>
-            <a:lvl9pPr marL="3657600" indent="0">
-              <a:buNone/>
-              <a:defRPr sz="1600" b="1"/>
+            <a:lvl9pPr marL="1853306" indent="0">
+              <a:buNone/>
+              <a:defRPr sz="811" b="1"/>
             </a:lvl9pPr>
           </a:lstStyle>
           <a:p>
@@ -1735,13 +2218,7 @@
       </p:sp>
       <p:sp>
         <p:nvSpPr>
-          <p:cNvPr id="6" name="Content Placeholder 5">
-            <a:extLst>
-              <a:ext uri="{FF2B5EF4-FFF2-40B4-BE49-F238E27FC236}">
-                <a16:creationId xmlns:a16="http://schemas.microsoft.com/office/drawing/2014/main" id="{37A73B35-21AA-7F48-A099-A39C68786FAB}"/>
-              </a:ext>
-            </a:extLst>
-          </p:cNvPr>
+          <p:cNvPr id="6" name="Content Placeholder 5"/>
           <p:cNvSpPr>
             <a:spLocks noGrp="1"/>
           </p:cNvSpPr>
@@ -1751,8 +2228,8 @@
         </p:nvSpPr>
         <p:spPr>
           <a:xfrm>
-            <a:off x="6172200" y="2505075"/>
-            <a:ext cx="5183188" cy="3684588"/>
+            <a:off x="6172200" y="1269354"/>
+            <a:ext cx="5183188" cy="1867029"/>
           </a:xfrm>
         </p:spPr>
         <p:txBody>
@@ -1792,18 +2269,13 @@
               <a:rPr lang="en-US"/>
               <a:t>Fifth level</a:t>
             </a:r>
-          </a:p>
-        </p:txBody>
-      </p:sp>
-      <p:sp>
-        <p:nvSpPr>
-          <p:cNvPr id="7" name="Date Placeholder 6">
-            <a:extLst>
-              <a:ext uri="{FF2B5EF4-FFF2-40B4-BE49-F238E27FC236}">
-                <a16:creationId xmlns:a16="http://schemas.microsoft.com/office/drawing/2014/main" id="{E28D6D98-FD4F-C540-B5BA-7A1A3329587D}"/>
-              </a:ext>
-            </a:extLst>
-          </p:cNvPr>
+            <a:endParaRPr lang="en-US" dirty="0"/>
+          </a:p>
+        </p:txBody>
+      </p:sp>
+      <p:sp>
+        <p:nvSpPr>
+          <p:cNvPr id="7" name="Date Placeholder 6"/>
           <p:cNvSpPr>
             <a:spLocks noGrp="1"/>
           </p:cNvSpPr>
@@ -1826,13 +2298,7 @@
       </p:sp>
       <p:sp>
         <p:nvSpPr>
-          <p:cNvPr id="8" name="Footer Placeholder 7">
-            <a:extLst>
-              <a:ext uri="{FF2B5EF4-FFF2-40B4-BE49-F238E27FC236}">
-                <a16:creationId xmlns:a16="http://schemas.microsoft.com/office/drawing/2014/main" id="{254C8A83-E700-CE4F-99CE-9E03DDE031A4}"/>
-              </a:ext>
-            </a:extLst>
-          </p:cNvPr>
+          <p:cNvPr id="8" name="Footer Placeholder 7"/>
           <p:cNvSpPr>
             <a:spLocks noGrp="1"/>
           </p:cNvSpPr>
@@ -1851,13 +2317,7 @@
       </p:sp>
       <p:sp>
         <p:nvSpPr>
-          <p:cNvPr id="9" name="Slide Number Placeholder 8">
-            <a:extLst>
-              <a:ext uri="{FF2B5EF4-FFF2-40B4-BE49-F238E27FC236}">
-                <a16:creationId xmlns:a16="http://schemas.microsoft.com/office/drawing/2014/main" id="{47C7E954-C6EC-5B45-8704-A5FD990C8426}"/>
-              </a:ext>
-            </a:extLst>
-          </p:cNvPr>
+          <p:cNvPr id="9" name="Slide Number Placeholder 8"/>
           <p:cNvSpPr>
             <a:spLocks noGrp="1"/>
           </p:cNvSpPr>
@@ -1881,7 +2341,7 @@
     </p:spTree>
     <p:extLst>
       <p:ext uri="{BB962C8B-B14F-4D97-AF65-F5344CB8AC3E}">
-        <p14:creationId xmlns:p14="http://schemas.microsoft.com/office/powerpoint/2010/main" val="2578277631"/>
+        <p14:creationId xmlns:p14="http://schemas.microsoft.com/office/powerpoint/2010/main" val="3695973668"/>
       </p:ext>
     </p:extLst>
   </p:cSld>
@@ -1910,13 +2370,7 @@
       </p:grpSpPr>
       <p:sp>
         <p:nvSpPr>
-          <p:cNvPr id="2" name="Title 1">
-            <a:extLst>
-              <a:ext uri="{FF2B5EF4-FFF2-40B4-BE49-F238E27FC236}">
-                <a16:creationId xmlns:a16="http://schemas.microsoft.com/office/drawing/2014/main" id="{09354B8D-4EDA-E24D-8184-B7CF99A4765E}"/>
-              </a:ext>
-            </a:extLst>
-          </p:cNvPr>
+          <p:cNvPr id="2" name="Title 1"/>
           <p:cNvSpPr>
             <a:spLocks noGrp="1"/>
           </p:cNvSpPr>
@@ -1933,18 +2387,13 @@
               <a:rPr lang="en-US"/>
               <a:t>Click to edit Master title style</a:t>
             </a:r>
-          </a:p>
-        </p:txBody>
-      </p:sp>
-      <p:sp>
-        <p:nvSpPr>
-          <p:cNvPr id="3" name="Date Placeholder 2">
-            <a:extLst>
-              <a:ext uri="{FF2B5EF4-FFF2-40B4-BE49-F238E27FC236}">
-                <a16:creationId xmlns:a16="http://schemas.microsoft.com/office/drawing/2014/main" id="{7A470B4A-1163-DA43-A70E-33F21CC370AE}"/>
-              </a:ext>
-            </a:extLst>
-          </p:cNvPr>
+            <a:endParaRPr lang="en-US" dirty="0"/>
+          </a:p>
+        </p:txBody>
+      </p:sp>
+      <p:sp>
+        <p:nvSpPr>
+          <p:cNvPr id="3" name="Date Placeholder 2"/>
           <p:cNvSpPr>
             <a:spLocks noGrp="1"/>
           </p:cNvSpPr>
@@ -1967,13 +2416,7 @@
       </p:sp>
       <p:sp>
         <p:nvSpPr>
-          <p:cNvPr id="4" name="Footer Placeholder 3">
-            <a:extLst>
-              <a:ext uri="{FF2B5EF4-FFF2-40B4-BE49-F238E27FC236}">
-                <a16:creationId xmlns:a16="http://schemas.microsoft.com/office/drawing/2014/main" id="{E94FC8C9-43FE-6540-9B06-6C1BC7957726}"/>
-              </a:ext>
-            </a:extLst>
-          </p:cNvPr>
+          <p:cNvPr id="4" name="Footer Placeholder 3"/>
           <p:cNvSpPr>
             <a:spLocks noGrp="1"/>
           </p:cNvSpPr>
@@ -1992,13 +2435,7 @@
       </p:sp>
       <p:sp>
         <p:nvSpPr>
-          <p:cNvPr id="5" name="Slide Number Placeholder 4">
-            <a:extLst>
-              <a:ext uri="{FF2B5EF4-FFF2-40B4-BE49-F238E27FC236}">
-                <a16:creationId xmlns:a16="http://schemas.microsoft.com/office/drawing/2014/main" id="{3E3452E0-9FD0-4A4D-B5F1-D2FB090DC306}"/>
-              </a:ext>
-            </a:extLst>
-          </p:cNvPr>
+          <p:cNvPr id="5" name="Slide Number Placeholder 4"/>
           <p:cNvSpPr>
             <a:spLocks noGrp="1"/>
           </p:cNvSpPr>
@@ -2022,7 +2459,7 @@
     </p:spTree>
     <p:extLst>
       <p:ext uri="{BB962C8B-B14F-4D97-AF65-F5344CB8AC3E}">
-        <p14:creationId xmlns:p14="http://schemas.microsoft.com/office/powerpoint/2010/main" val="369546310"/>
+        <p14:creationId xmlns:p14="http://schemas.microsoft.com/office/powerpoint/2010/main" val="1856681183"/>
       </p:ext>
     </p:extLst>
   </p:cSld>
@@ -2051,13 +2488,7 @@
       </p:grpSpPr>
       <p:sp>
         <p:nvSpPr>
-          <p:cNvPr id="2" name="Date Placeholder 1">
-            <a:extLst>
-              <a:ext uri="{FF2B5EF4-FFF2-40B4-BE49-F238E27FC236}">
-                <a16:creationId xmlns:a16="http://schemas.microsoft.com/office/drawing/2014/main" id="{45BCC2EC-ECA9-8845-AE02-CAD3D04F30A6}"/>
-              </a:ext>
-            </a:extLst>
-          </p:cNvPr>
+          <p:cNvPr id="2" name="Date Placeholder 1"/>
           <p:cNvSpPr>
             <a:spLocks noGrp="1"/>
           </p:cNvSpPr>
@@ -2080,13 +2511,7 @@
       </p:sp>
       <p:sp>
         <p:nvSpPr>
-          <p:cNvPr id="3" name="Footer Placeholder 2">
-            <a:extLst>
-              <a:ext uri="{FF2B5EF4-FFF2-40B4-BE49-F238E27FC236}">
-                <a16:creationId xmlns:a16="http://schemas.microsoft.com/office/drawing/2014/main" id="{FFEC5E11-BB2E-9D4F-9D77-3691AF50BBFC}"/>
-              </a:ext>
-            </a:extLst>
-          </p:cNvPr>
+          <p:cNvPr id="3" name="Footer Placeholder 2"/>
           <p:cNvSpPr>
             <a:spLocks noGrp="1"/>
           </p:cNvSpPr>
@@ -2105,13 +2530,7 @@
       </p:sp>
       <p:sp>
         <p:nvSpPr>
-          <p:cNvPr id="4" name="Slide Number Placeholder 3">
-            <a:extLst>
-              <a:ext uri="{FF2B5EF4-FFF2-40B4-BE49-F238E27FC236}">
-                <a16:creationId xmlns:a16="http://schemas.microsoft.com/office/drawing/2014/main" id="{43D1D122-57C5-3E49-9214-74604D67216E}"/>
-              </a:ext>
-            </a:extLst>
-          </p:cNvPr>
+          <p:cNvPr id="4" name="Slide Number Placeholder 3"/>
           <p:cNvSpPr>
             <a:spLocks noGrp="1"/>
           </p:cNvSpPr>
@@ -2135,7 +2554,7 @@
     </p:spTree>
     <p:extLst>
       <p:ext uri="{BB962C8B-B14F-4D97-AF65-F5344CB8AC3E}">
-        <p14:creationId xmlns:p14="http://schemas.microsoft.com/office/powerpoint/2010/main" val="39763288"/>
+        <p14:creationId xmlns:p14="http://schemas.microsoft.com/office/powerpoint/2010/main" val="3544929470"/>
       </p:ext>
     </p:extLst>
   </p:cSld>
@@ -2164,13 +2583,7 @@
       </p:grpSpPr>
       <p:sp>
         <p:nvSpPr>
-          <p:cNvPr id="2" name="Title 1">
-            <a:extLst>
-              <a:ext uri="{FF2B5EF4-FFF2-40B4-BE49-F238E27FC236}">
-                <a16:creationId xmlns:a16="http://schemas.microsoft.com/office/drawing/2014/main" id="{91CC5C5A-849F-4147-A377-2329A2103AC3}"/>
-              </a:ext>
-            </a:extLst>
-          </p:cNvPr>
+          <p:cNvPr id="2" name="Title 1"/>
           <p:cNvSpPr>
             <a:spLocks noGrp="1"/>
           </p:cNvSpPr>
@@ -2180,15 +2593,15 @@
         </p:nvSpPr>
         <p:spPr>
           <a:xfrm>
-            <a:off x="839788" y="457200"/>
-            <a:ext cx="3932237" cy="1600200"/>
+            <a:off x="839789" y="231669"/>
+            <a:ext cx="3932237" cy="810842"/>
           </a:xfrm>
         </p:spPr>
         <p:txBody>
           <a:bodyPr anchor="b"/>
           <a:lstStyle>
             <a:lvl1pPr>
-              <a:defRPr sz="3200"/>
+              <a:defRPr sz="1621"/>
             </a:lvl1pPr>
           </a:lstStyle>
           <a:p>
@@ -2196,18 +2609,13 @@
               <a:rPr lang="en-US"/>
               <a:t>Click to edit Master title style</a:t>
             </a:r>
-          </a:p>
-        </p:txBody>
-      </p:sp>
-      <p:sp>
-        <p:nvSpPr>
-          <p:cNvPr id="3" name="Content Placeholder 2">
-            <a:extLst>
-              <a:ext uri="{FF2B5EF4-FFF2-40B4-BE49-F238E27FC236}">
-                <a16:creationId xmlns:a16="http://schemas.microsoft.com/office/drawing/2014/main" id="{10AD0CBD-053A-F941-B394-053F183D53F2}"/>
-              </a:ext>
-            </a:extLst>
-          </p:cNvPr>
+            <a:endParaRPr lang="en-US" dirty="0"/>
+          </a:p>
+        </p:txBody>
+      </p:sp>
+      <p:sp>
+        <p:nvSpPr>
+          <p:cNvPr id="3" name="Content Placeholder 2"/>
           <p:cNvSpPr>
             <a:spLocks noGrp="1"/>
           </p:cNvSpPr>
@@ -2217,39 +2625,39 @@
         </p:nvSpPr>
         <p:spPr>
           <a:xfrm>
-            <a:off x="5183188" y="987425"/>
-            <a:ext cx="6172200" cy="4873625"/>
+            <a:off x="5183188" y="500342"/>
+            <a:ext cx="6172200" cy="2469529"/>
           </a:xfrm>
         </p:spPr>
         <p:txBody>
           <a:bodyPr/>
           <a:lstStyle>
             <a:lvl1pPr>
-              <a:defRPr sz="3200"/>
+              <a:defRPr sz="1621"/>
             </a:lvl1pPr>
             <a:lvl2pPr>
-              <a:defRPr sz="2800"/>
+              <a:defRPr sz="1419"/>
             </a:lvl2pPr>
             <a:lvl3pPr>
-              <a:defRPr sz="2400"/>
+              <a:defRPr sz="1216"/>
             </a:lvl3pPr>
             <a:lvl4pPr>
-              <a:defRPr sz="2000"/>
+              <a:defRPr sz="1013"/>
             </a:lvl4pPr>
             <a:lvl5pPr>
-              <a:defRPr sz="2000"/>
+              <a:defRPr sz="1013"/>
             </a:lvl5pPr>
             <a:lvl6pPr>
-              <a:defRPr sz="2000"/>
+              <a:defRPr sz="1013"/>
             </a:lvl6pPr>
             <a:lvl7pPr>
-              <a:defRPr sz="2000"/>
+              <a:defRPr sz="1013"/>
             </a:lvl7pPr>
             <a:lvl8pPr>
-              <a:defRPr sz="2000"/>
+              <a:defRPr sz="1013"/>
             </a:lvl8pPr>
             <a:lvl9pPr>
-              <a:defRPr sz="2000"/>
+              <a:defRPr sz="1013"/>
             </a:lvl9pPr>
           </a:lstStyle>
           <a:p>
@@ -2286,18 +2694,13 @@
               <a:rPr lang="en-US"/>
               <a:t>Fifth level</a:t>
             </a:r>
-          </a:p>
-        </p:txBody>
-      </p:sp>
-      <p:sp>
-        <p:nvSpPr>
-          <p:cNvPr id="4" name="Text Placeholder 3">
-            <a:extLst>
-              <a:ext uri="{FF2B5EF4-FFF2-40B4-BE49-F238E27FC236}">
-                <a16:creationId xmlns:a16="http://schemas.microsoft.com/office/drawing/2014/main" id="{756BEBF8-636E-EB42-90BE-8E113B3D81D3}"/>
-              </a:ext>
-            </a:extLst>
-          </p:cNvPr>
+            <a:endParaRPr lang="en-US" dirty="0"/>
+          </a:p>
+        </p:txBody>
+      </p:sp>
+      <p:sp>
+        <p:nvSpPr>
+          <p:cNvPr id="4" name="Text Placeholder 3"/>
           <p:cNvSpPr>
             <a:spLocks noGrp="1"/>
           </p:cNvSpPr>
@@ -2307,8 +2710,8 @@
         </p:nvSpPr>
         <p:spPr>
           <a:xfrm>
-            <a:off x="839788" y="2057400"/>
-            <a:ext cx="3932237" cy="3811588"/>
+            <a:off x="839789" y="1042512"/>
+            <a:ext cx="3932237" cy="1931381"/>
           </a:xfrm>
         </p:spPr>
         <p:txBody>
@@ -2316,39 +2719,39 @@
           <a:lstStyle>
             <a:lvl1pPr marL="0" indent="0">
               <a:buNone/>
-              <a:defRPr sz="1600"/>
+              <a:defRPr sz="811"/>
             </a:lvl1pPr>
-            <a:lvl2pPr marL="457200" indent="0">
-              <a:buNone/>
-              <a:defRPr sz="1400"/>
+            <a:lvl2pPr marL="231663" indent="0">
+              <a:buNone/>
+              <a:defRPr sz="709"/>
             </a:lvl2pPr>
-            <a:lvl3pPr marL="914400" indent="0">
-              <a:buNone/>
-              <a:defRPr sz="1200"/>
+            <a:lvl3pPr marL="463326" indent="0">
+              <a:buNone/>
+              <a:defRPr sz="608"/>
             </a:lvl3pPr>
-            <a:lvl4pPr marL="1371600" indent="0">
-              <a:buNone/>
-              <a:defRPr sz="1000"/>
+            <a:lvl4pPr marL="694990" indent="0">
+              <a:buNone/>
+              <a:defRPr sz="507"/>
             </a:lvl4pPr>
-            <a:lvl5pPr marL="1828800" indent="0">
-              <a:buNone/>
-              <a:defRPr sz="1000"/>
+            <a:lvl5pPr marL="926653" indent="0">
+              <a:buNone/>
+              <a:defRPr sz="507"/>
             </a:lvl5pPr>
-            <a:lvl6pPr marL="2286000" indent="0">
-              <a:buNone/>
-              <a:defRPr sz="1000"/>
+            <a:lvl6pPr marL="1158316" indent="0">
+              <a:buNone/>
+              <a:defRPr sz="507"/>
             </a:lvl6pPr>
-            <a:lvl7pPr marL="2743200" indent="0">
-              <a:buNone/>
-              <a:defRPr sz="1000"/>
+            <a:lvl7pPr marL="1389979" indent="0">
+              <a:buNone/>
+              <a:defRPr sz="507"/>
             </a:lvl7pPr>
-            <a:lvl8pPr marL="3200400" indent="0">
-              <a:buNone/>
-              <a:defRPr sz="1000"/>
+            <a:lvl8pPr marL="1621643" indent="0">
+              <a:buNone/>
+              <a:defRPr sz="507"/>
             </a:lvl8pPr>
-            <a:lvl9pPr marL="3657600" indent="0">
-              <a:buNone/>
-              <a:defRPr sz="1000"/>
+            <a:lvl9pPr marL="1853306" indent="0">
+              <a:buNone/>
+              <a:defRPr sz="507"/>
             </a:lvl9pPr>
           </a:lstStyle>
           <a:p>
@@ -2362,13 +2765,7 @@
       </p:sp>
       <p:sp>
         <p:nvSpPr>
-          <p:cNvPr id="5" name="Date Placeholder 4">
-            <a:extLst>
-              <a:ext uri="{FF2B5EF4-FFF2-40B4-BE49-F238E27FC236}">
-                <a16:creationId xmlns:a16="http://schemas.microsoft.com/office/drawing/2014/main" id="{00B8DAE7-7ECF-4F43-80C3-C693DE799EB8}"/>
-              </a:ext>
-            </a:extLst>
-          </p:cNvPr>
+          <p:cNvPr id="5" name="Date Placeholder 4"/>
           <p:cNvSpPr>
             <a:spLocks noGrp="1"/>
           </p:cNvSpPr>
@@ -2391,13 +2788,7 @@
       </p:sp>
       <p:sp>
         <p:nvSpPr>
-          <p:cNvPr id="6" name="Footer Placeholder 5">
-            <a:extLst>
-              <a:ext uri="{FF2B5EF4-FFF2-40B4-BE49-F238E27FC236}">
-                <a16:creationId xmlns:a16="http://schemas.microsoft.com/office/drawing/2014/main" id="{0B81641E-6923-2943-9997-80CED4AF57C1}"/>
-              </a:ext>
-            </a:extLst>
-          </p:cNvPr>
+          <p:cNvPr id="6" name="Footer Placeholder 5"/>
           <p:cNvSpPr>
             <a:spLocks noGrp="1"/>
           </p:cNvSpPr>
@@ -2416,13 +2807,7 @@
       </p:sp>
       <p:sp>
         <p:nvSpPr>
-          <p:cNvPr id="7" name="Slide Number Placeholder 6">
-            <a:extLst>
-              <a:ext uri="{FF2B5EF4-FFF2-40B4-BE49-F238E27FC236}">
-                <a16:creationId xmlns:a16="http://schemas.microsoft.com/office/drawing/2014/main" id="{CB9E133F-F7F6-0543-8E03-0BFC94611CA5}"/>
-              </a:ext>
-            </a:extLst>
-          </p:cNvPr>
+          <p:cNvPr id="7" name="Slide Number Placeholder 6"/>
           <p:cNvSpPr>
             <a:spLocks noGrp="1"/>
           </p:cNvSpPr>
@@ -2446,7 +2831,7 @@
     </p:spTree>
     <p:extLst>
       <p:ext uri="{BB962C8B-B14F-4D97-AF65-F5344CB8AC3E}">
-        <p14:creationId xmlns:p14="http://schemas.microsoft.com/office/powerpoint/2010/main" val="3678157726"/>
+        <p14:creationId xmlns:p14="http://schemas.microsoft.com/office/powerpoint/2010/main" val="2725030197"/>
       </p:ext>
     </p:extLst>
   </p:cSld>
@@ -2475,13 +2860,7 @@
       </p:grpSpPr>
       <p:sp>
         <p:nvSpPr>
-          <p:cNvPr id="2" name="Title 1">
-            <a:extLst>
-              <a:ext uri="{FF2B5EF4-FFF2-40B4-BE49-F238E27FC236}">
-                <a16:creationId xmlns:a16="http://schemas.microsoft.com/office/drawing/2014/main" id="{C062BF62-59B1-5245-90AB-6C64CD52939B}"/>
-              </a:ext>
-            </a:extLst>
-          </p:cNvPr>
+          <p:cNvPr id="2" name="Title 1"/>
           <p:cNvSpPr>
             <a:spLocks noGrp="1"/>
           </p:cNvSpPr>
@@ -2491,15 +2870,15 @@
         </p:nvSpPr>
         <p:spPr>
           <a:xfrm>
-            <a:off x="839788" y="457200"/>
-            <a:ext cx="3932237" cy="1600200"/>
+            <a:off x="839789" y="231669"/>
+            <a:ext cx="3932237" cy="810842"/>
           </a:xfrm>
         </p:spPr>
         <p:txBody>
           <a:bodyPr anchor="b"/>
           <a:lstStyle>
             <a:lvl1pPr>
-              <a:defRPr sz="3200"/>
+              <a:defRPr sz="1621"/>
             </a:lvl1pPr>
           </a:lstStyle>
           <a:p>
@@ -2507,20 +2886,15 @@
               <a:rPr lang="en-US"/>
               <a:t>Click to edit Master title style</a:t>
             </a:r>
-          </a:p>
-        </p:txBody>
-      </p:sp>
-      <p:sp>
-        <p:nvSpPr>
-          <p:cNvPr id="3" name="Picture Placeholder 2">
-            <a:extLst>
-              <a:ext uri="{FF2B5EF4-FFF2-40B4-BE49-F238E27FC236}">
-                <a16:creationId xmlns:a16="http://schemas.microsoft.com/office/drawing/2014/main" id="{61248FB5-A9CF-A849-8970-076C56818D40}"/>
-              </a:ext>
-            </a:extLst>
-          </p:cNvPr>
-          <p:cNvSpPr>
-            <a:spLocks noGrp="1"/>
+            <a:endParaRPr lang="en-US" dirty="0"/>
+          </a:p>
+        </p:txBody>
+      </p:sp>
+      <p:sp>
+        <p:nvSpPr>
+          <p:cNvPr id="3" name="Picture Placeholder 2"/>
+          <p:cNvSpPr>
+            <a:spLocks noGrp="1" noChangeAspect="1"/>
           </p:cNvSpPr>
           <p:nvPr>
             <p:ph type="pic" idx="1"/>
@@ -2528,64 +2902,62 @@
         </p:nvSpPr>
         <p:spPr>
           <a:xfrm>
-            <a:off x="5183188" y="987425"/>
-            <a:ext cx="6172200" cy="4873625"/>
+            <a:off x="5183188" y="500342"/>
+            <a:ext cx="6172200" cy="2469529"/>
           </a:xfrm>
         </p:spPr>
         <p:txBody>
-          <a:bodyPr/>
+          <a:bodyPr anchor="t"/>
           <a:lstStyle>
             <a:lvl1pPr marL="0" indent="0">
               <a:buNone/>
-              <a:defRPr sz="3200"/>
+              <a:defRPr sz="1621"/>
             </a:lvl1pPr>
-            <a:lvl2pPr marL="457200" indent="0">
-              <a:buNone/>
-              <a:defRPr sz="2800"/>
+            <a:lvl2pPr marL="231663" indent="0">
+              <a:buNone/>
+              <a:defRPr sz="1419"/>
             </a:lvl2pPr>
-            <a:lvl3pPr marL="914400" indent="0">
-              <a:buNone/>
-              <a:defRPr sz="2400"/>
+            <a:lvl3pPr marL="463326" indent="0">
+              <a:buNone/>
+              <a:defRPr sz="1216"/>
             </a:lvl3pPr>
-            <a:lvl4pPr marL="1371600" indent="0">
-              <a:buNone/>
-              <a:defRPr sz="2000"/>
+            <a:lvl4pPr marL="694990" indent="0">
+              <a:buNone/>
+              <a:defRPr sz="1013"/>
             </a:lvl4pPr>
-            <a:lvl5pPr marL="1828800" indent="0">
-              <a:buNone/>
-              <a:defRPr sz="2000"/>
+            <a:lvl5pPr marL="926653" indent="0">
+              <a:buNone/>
+              <a:defRPr sz="1013"/>
             </a:lvl5pPr>
-            <a:lvl6pPr marL="2286000" indent="0">
-              <a:buNone/>
-              <a:defRPr sz="2000"/>
+            <a:lvl6pPr marL="1158316" indent="0">
+              <a:buNone/>
+              <a:defRPr sz="1013"/>
             </a:lvl6pPr>
-            <a:lvl7pPr marL="2743200" indent="0">
-              <a:buNone/>
-              <a:defRPr sz="2000"/>
+            <a:lvl7pPr marL="1389979" indent="0">
+              <a:buNone/>
+              <a:defRPr sz="1013"/>
             </a:lvl7pPr>
-            <a:lvl8pPr marL="3200400" indent="0">
-              <a:buNone/>
-              <a:defRPr sz="2000"/>
+            <a:lvl8pPr marL="1621643" indent="0">
+              <a:buNone/>
+              <a:defRPr sz="1013"/>
             </a:lvl8pPr>
-            <a:lvl9pPr marL="3657600" indent="0">
-              <a:buNone/>
-              <a:defRPr sz="2000"/>
+            <a:lvl9pPr marL="1853306" indent="0">
+              <a:buNone/>
+              <a:defRPr sz="1013"/>
             </a:lvl9pPr>
           </a:lstStyle>
           <a:p>
-            <a:endParaRPr lang="en-US"/>
-          </a:p>
-        </p:txBody>
-      </p:sp>
-      <p:sp>
-        <p:nvSpPr>
-          <p:cNvPr id="4" name="Text Placeholder 3">
-            <a:extLst>
-              <a:ext uri="{FF2B5EF4-FFF2-40B4-BE49-F238E27FC236}">
-                <a16:creationId xmlns:a16="http://schemas.microsoft.com/office/drawing/2014/main" id="{A0B0EA40-A847-A14D-A6C7-EAF2D3AA7EA0}"/>
-              </a:ext>
-            </a:extLst>
-          </p:cNvPr>
+            <a:r>
+              <a:rPr lang="en-US"/>
+              <a:t>Click icon to add picture</a:t>
+            </a:r>
+            <a:endParaRPr lang="en-US" dirty="0"/>
+          </a:p>
+        </p:txBody>
+      </p:sp>
+      <p:sp>
+        <p:nvSpPr>
+          <p:cNvPr id="4" name="Text Placeholder 3"/>
           <p:cNvSpPr>
             <a:spLocks noGrp="1"/>
           </p:cNvSpPr>
@@ -2595,8 +2967,8 @@
         </p:nvSpPr>
         <p:spPr>
           <a:xfrm>
-            <a:off x="839788" y="2057400"/>
-            <a:ext cx="3932237" cy="3811588"/>
+            <a:off x="839789" y="1042512"/>
+            <a:ext cx="3932237" cy="1931381"/>
           </a:xfrm>
         </p:spPr>
         <p:txBody>
@@ -2604,39 +2976,39 @@
           <a:lstStyle>
             <a:lvl1pPr marL="0" indent="0">
               <a:buNone/>
-              <a:defRPr sz="1600"/>
+              <a:defRPr sz="811"/>
             </a:lvl1pPr>
-            <a:lvl2pPr marL="457200" indent="0">
-              <a:buNone/>
-              <a:defRPr sz="1400"/>
+            <a:lvl2pPr marL="231663" indent="0">
+              <a:buNone/>
+              <a:defRPr sz="709"/>
             </a:lvl2pPr>
-            <a:lvl3pPr marL="914400" indent="0">
-              <a:buNone/>
-              <a:defRPr sz="1200"/>
+            <a:lvl3pPr marL="463326" indent="0">
+              <a:buNone/>
+              <a:defRPr sz="608"/>
             </a:lvl3pPr>
-            <a:lvl4pPr marL="1371600" indent="0">
-              <a:buNone/>
-              <a:defRPr sz="1000"/>
+            <a:lvl4pPr marL="694990" indent="0">
+              <a:buNone/>
+              <a:defRPr sz="507"/>
             </a:lvl4pPr>
-            <a:lvl5pPr marL="1828800" indent="0">
-              <a:buNone/>
-              <a:defRPr sz="1000"/>
+            <a:lvl5pPr marL="926653" indent="0">
+              <a:buNone/>
+              <a:defRPr sz="507"/>
             </a:lvl5pPr>
-            <a:lvl6pPr marL="2286000" indent="0">
-              <a:buNone/>
-              <a:defRPr sz="1000"/>
+            <a:lvl6pPr marL="1158316" indent="0">
+              <a:buNone/>
+              <a:defRPr sz="507"/>
             </a:lvl6pPr>
-            <a:lvl7pPr marL="2743200" indent="0">
-              <a:buNone/>
-              <a:defRPr sz="1000"/>
+            <a:lvl7pPr marL="1389979" indent="0">
+              <a:buNone/>
+              <a:defRPr sz="507"/>
             </a:lvl7pPr>
-            <a:lvl8pPr marL="3200400" indent="0">
-              <a:buNone/>
-              <a:defRPr sz="1000"/>
+            <a:lvl8pPr marL="1621643" indent="0">
+              <a:buNone/>
+              <a:defRPr sz="507"/>
             </a:lvl8pPr>
-            <a:lvl9pPr marL="3657600" indent="0">
-              <a:buNone/>
-              <a:defRPr sz="1000"/>
+            <a:lvl9pPr marL="1853306" indent="0">
+              <a:buNone/>
+              <a:defRPr sz="507"/>
             </a:lvl9pPr>
           </a:lstStyle>
           <a:p>
@@ -2650,13 +3022,7 @@
       </p:sp>
       <p:sp>
         <p:nvSpPr>
-          <p:cNvPr id="5" name="Date Placeholder 4">
-            <a:extLst>
-              <a:ext uri="{FF2B5EF4-FFF2-40B4-BE49-F238E27FC236}">
-                <a16:creationId xmlns:a16="http://schemas.microsoft.com/office/drawing/2014/main" id="{50CF7EC6-6DFC-844E-A7B3-D9804D4AE901}"/>
-              </a:ext>
-            </a:extLst>
-          </p:cNvPr>
+          <p:cNvPr id="5" name="Date Placeholder 4"/>
           <p:cNvSpPr>
             <a:spLocks noGrp="1"/>
           </p:cNvSpPr>
@@ -2679,13 +3045,7 @@
       </p:sp>
       <p:sp>
         <p:nvSpPr>
-          <p:cNvPr id="6" name="Footer Placeholder 5">
-            <a:extLst>
-              <a:ext uri="{FF2B5EF4-FFF2-40B4-BE49-F238E27FC236}">
-                <a16:creationId xmlns:a16="http://schemas.microsoft.com/office/drawing/2014/main" id="{9A578BF8-49B7-A441-86A9-481026C2B4DD}"/>
-              </a:ext>
-            </a:extLst>
-          </p:cNvPr>
+          <p:cNvPr id="6" name="Footer Placeholder 5"/>
           <p:cNvSpPr>
             <a:spLocks noGrp="1"/>
           </p:cNvSpPr>
@@ -2704,13 +3064,7 @@
       </p:sp>
       <p:sp>
         <p:nvSpPr>
-          <p:cNvPr id="7" name="Slide Number Placeholder 6">
-            <a:extLst>
-              <a:ext uri="{FF2B5EF4-FFF2-40B4-BE49-F238E27FC236}">
-                <a16:creationId xmlns:a16="http://schemas.microsoft.com/office/drawing/2014/main" id="{25EE6239-F0E4-8949-85D1-FAF1BCB9C033}"/>
-              </a:ext>
-            </a:extLst>
-          </p:cNvPr>
+          <p:cNvPr id="7" name="Slide Number Placeholder 6"/>
           <p:cNvSpPr>
             <a:spLocks noGrp="1"/>
           </p:cNvSpPr>
@@ -2734,7 +3088,7 @@
     </p:spTree>
     <p:extLst>
       <p:ext uri="{BB962C8B-B14F-4D97-AF65-F5344CB8AC3E}">
-        <p14:creationId xmlns:p14="http://schemas.microsoft.com/office/powerpoint/2010/main" val="913262359"/>
+        <p14:creationId xmlns:p14="http://schemas.microsoft.com/office/powerpoint/2010/main" val="2027006417"/>
       </p:ext>
     </p:extLst>
   </p:cSld>
@@ -2768,13 +3122,7 @@
       </p:grpSpPr>
       <p:sp>
         <p:nvSpPr>
-          <p:cNvPr id="2" name="Title Placeholder 1">
-            <a:extLst>
-              <a:ext uri="{FF2B5EF4-FFF2-40B4-BE49-F238E27FC236}">
-                <a16:creationId xmlns:a16="http://schemas.microsoft.com/office/drawing/2014/main" id="{3FCF26A2-8918-FD48-A8C9-D87FDEEA6B8E}"/>
-              </a:ext>
-            </a:extLst>
-          </p:cNvPr>
+          <p:cNvPr id="2" name="Title Placeholder 1"/>
           <p:cNvSpPr>
             <a:spLocks noGrp="1"/>
           </p:cNvSpPr>
@@ -2784,8 +3132,8 @@
         </p:nvSpPr>
         <p:spPr>
           <a:xfrm>
-            <a:off x="838200" y="365125"/>
-            <a:ext cx="10515600" cy="1325563"/>
+            <a:off x="838200" y="185014"/>
+            <a:ext cx="10515600" cy="671680"/>
           </a:xfrm>
           <a:prstGeom prst="rect">
             <a:avLst/>
@@ -2801,18 +3149,13 @@
               <a:rPr lang="en-US"/>
               <a:t>Click to edit Master title style</a:t>
             </a:r>
-          </a:p>
-        </p:txBody>
-      </p:sp>
-      <p:sp>
-        <p:nvSpPr>
-          <p:cNvPr id="3" name="Text Placeholder 2">
-            <a:extLst>
-              <a:ext uri="{FF2B5EF4-FFF2-40B4-BE49-F238E27FC236}">
-                <a16:creationId xmlns:a16="http://schemas.microsoft.com/office/drawing/2014/main" id="{02A149E5-5B2D-D74D-A81B-11F0C153CB56}"/>
-              </a:ext>
-            </a:extLst>
-          </p:cNvPr>
+            <a:endParaRPr lang="en-US" dirty="0"/>
+          </a:p>
+        </p:txBody>
+      </p:sp>
+      <p:sp>
+        <p:nvSpPr>
+          <p:cNvPr id="3" name="Text Placeholder 2"/>
           <p:cNvSpPr>
             <a:spLocks noGrp="1"/>
           </p:cNvSpPr>
@@ -2822,8 +3165,8 @@
         </p:nvSpPr>
         <p:spPr>
           <a:xfrm>
-            <a:off x="838200" y="1825625"/>
-            <a:ext cx="10515600" cy="4351338"/>
+            <a:off x="838200" y="925068"/>
+            <a:ext cx="10515600" cy="2204880"/>
           </a:xfrm>
           <a:prstGeom prst="rect">
             <a:avLst/>
@@ -2868,18 +3211,13 @@
               <a:rPr lang="en-US"/>
               <a:t>Fifth level</a:t>
             </a:r>
-          </a:p>
-        </p:txBody>
-      </p:sp>
-      <p:sp>
-        <p:nvSpPr>
-          <p:cNvPr id="4" name="Date Placeholder 3">
-            <a:extLst>
-              <a:ext uri="{FF2B5EF4-FFF2-40B4-BE49-F238E27FC236}">
-                <a16:creationId xmlns:a16="http://schemas.microsoft.com/office/drawing/2014/main" id="{B5D96435-9FDD-4441-9BAD-2ED7B8CB16B7}"/>
-              </a:ext>
-            </a:extLst>
-          </p:cNvPr>
+            <a:endParaRPr lang="en-US" dirty="0"/>
+          </a:p>
+        </p:txBody>
+      </p:sp>
+      <p:sp>
+        <p:nvSpPr>
+          <p:cNvPr id="4" name="Date Placeholder 3"/>
           <p:cNvSpPr>
             <a:spLocks noGrp="1"/>
           </p:cNvSpPr>
@@ -2889,8 +3227,8 @@
         </p:nvSpPr>
         <p:spPr>
           <a:xfrm>
-            <a:off x="838200" y="6356350"/>
-            <a:ext cx="2743200" cy="365125"/>
+            <a:off x="838200" y="3220845"/>
+            <a:ext cx="2743200" cy="185014"/>
           </a:xfrm>
           <a:prstGeom prst="rect">
             <a:avLst/>
@@ -2900,7 +3238,7 @@
           <a:bodyPr vert="horz" lIns="91440" tIns="45720" rIns="91440" bIns="45720" rtlCol="0" anchor="ctr"/>
           <a:lstStyle>
             <a:lvl1pPr algn="l">
-              <a:defRPr sz="1200">
+              <a:defRPr sz="608">
                 <a:solidFill>
                   <a:schemeClr val="tx1">
                     <a:tint val="75000"/>
@@ -2920,13 +3258,7 @@
       </p:sp>
       <p:sp>
         <p:nvSpPr>
-          <p:cNvPr id="5" name="Footer Placeholder 4">
-            <a:extLst>
-              <a:ext uri="{FF2B5EF4-FFF2-40B4-BE49-F238E27FC236}">
-                <a16:creationId xmlns:a16="http://schemas.microsoft.com/office/drawing/2014/main" id="{40AE28FD-B9C4-E846-8372-5C5A181276D0}"/>
-              </a:ext>
-            </a:extLst>
-          </p:cNvPr>
+          <p:cNvPr id="5" name="Footer Placeholder 4"/>
           <p:cNvSpPr>
             <a:spLocks noGrp="1"/>
           </p:cNvSpPr>
@@ -2936,8 +3268,8 @@
         </p:nvSpPr>
         <p:spPr>
           <a:xfrm>
-            <a:off x="4038600" y="6356350"/>
-            <a:ext cx="4114800" cy="365125"/>
+            <a:off x="4038600" y="3220845"/>
+            <a:ext cx="4114800" cy="185014"/>
           </a:xfrm>
           <a:prstGeom prst="rect">
             <a:avLst/>
@@ -2947,7 +3279,7 @@
           <a:bodyPr vert="horz" lIns="91440" tIns="45720" rIns="91440" bIns="45720" rtlCol="0" anchor="ctr"/>
           <a:lstStyle>
             <a:lvl1pPr algn="ctr">
-              <a:defRPr sz="1200">
+              <a:defRPr sz="608">
                 <a:solidFill>
                   <a:schemeClr val="tx1">
                     <a:tint val="75000"/>
@@ -2963,13 +3295,7 @@
       </p:sp>
       <p:sp>
         <p:nvSpPr>
-          <p:cNvPr id="6" name="Slide Number Placeholder 5">
-            <a:extLst>
-              <a:ext uri="{FF2B5EF4-FFF2-40B4-BE49-F238E27FC236}">
-                <a16:creationId xmlns:a16="http://schemas.microsoft.com/office/drawing/2014/main" id="{F22CE91C-F3D2-094F-AD6B-CDA2D406829E}"/>
-              </a:ext>
-            </a:extLst>
-          </p:cNvPr>
+          <p:cNvPr id="6" name="Slide Number Placeholder 5"/>
           <p:cNvSpPr>
             <a:spLocks noGrp="1"/>
           </p:cNvSpPr>
@@ -2979,8 +3305,8 @@
         </p:nvSpPr>
         <p:spPr>
           <a:xfrm>
-            <a:off x="8610600" y="6356350"/>
-            <a:ext cx="2743200" cy="365125"/>
+            <a:off x="8610600" y="3220845"/>
+            <a:ext cx="2743200" cy="185014"/>
           </a:xfrm>
           <a:prstGeom prst="rect">
             <a:avLst/>
@@ -2990,7 +3316,7 @@
           <a:bodyPr vert="horz" lIns="91440" tIns="45720" rIns="91440" bIns="45720" rtlCol="0" anchor="ctr"/>
           <a:lstStyle>
             <a:lvl1pPr algn="r">
-              <a:defRPr sz="1200">
+              <a:defRPr sz="608">
                 <a:solidFill>
                   <a:schemeClr val="tx1">
                     <a:tint val="75000"/>
@@ -3011,27 +3337,27 @@
     </p:spTree>
     <p:extLst>
       <p:ext uri="{BB962C8B-B14F-4D97-AF65-F5344CB8AC3E}">
-        <p14:creationId xmlns:p14="http://schemas.microsoft.com/office/powerpoint/2010/main" val="3687965219"/>
+        <p14:creationId xmlns:p14="http://schemas.microsoft.com/office/powerpoint/2010/main" val="1837427678"/>
       </p:ext>
     </p:extLst>
   </p:cSld>
   <p:clrMap bg1="lt1" tx1="dk1" bg2="lt2" tx2="dk2" accent1="accent1" accent2="accent2" accent3="accent3" accent4="accent4" accent5="accent5" accent6="accent6" hlink="hlink" folHlink="folHlink"/>
   <p:sldLayoutIdLst>
-    <p:sldLayoutId id="2147483649" r:id="rId1"/>
-    <p:sldLayoutId id="2147483650" r:id="rId2"/>
-    <p:sldLayoutId id="2147483651" r:id="rId3"/>
-    <p:sldLayoutId id="2147483652" r:id="rId4"/>
-    <p:sldLayoutId id="2147483653" r:id="rId5"/>
-    <p:sldLayoutId id="2147483654" r:id="rId6"/>
-    <p:sldLayoutId id="2147483655" r:id="rId7"/>
-    <p:sldLayoutId id="2147483656" r:id="rId8"/>
-    <p:sldLayoutId id="2147483657" r:id="rId9"/>
-    <p:sldLayoutId id="2147483658" r:id="rId10"/>
-    <p:sldLayoutId id="2147483659" r:id="rId11"/>
+    <p:sldLayoutId id="2147483673" r:id="rId1"/>
+    <p:sldLayoutId id="2147483674" r:id="rId2"/>
+    <p:sldLayoutId id="2147483675" r:id="rId3"/>
+    <p:sldLayoutId id="2147483676" r:id="rId4"/>
+    <p:sldLayoutId id="2147483677" r:id="rId5"/>
+    <p:sldLayoutId id="2147483678" r:id="rId6"/>
+    <p:sldLayoutId id="2147483679" r:id="rId7"/>
+    <p:sldLayoutId id="2147483680" r:id="rId8"/>
+    <p:sldLayoutId id="2147483681" r:id="rId9"/>
+    <p:sldLayoutId id="2147483682" r:id="rId10"/>
+    <p:sldLayoutId id="2147483683" r:id="rId11"/>
   </p:sldLayoutIdLst>
   <p:txStyles>
     <p:titleStyle>
-      <a:lvl1pPr algn="l" defTabSz="914400" rtl="0" eaLnBrk="1" latinLnBrk="0" hangingPunct="1">
+      <a:lvl1pPr algn="l" defTabSz="463326" rtl="0" eaLnBrk="1" latinLnBrk="0" hangingPunct="1">
         <a:lnSpc>
           <a:spcPct val="90000"/>
         </a:lnSpc>
@@ -3039,7 +3365,7 @@
           <a:spcPct val="0"/>
         </a:spcBef>
         <a:buNone/>
-        <a:defRPr sz="4400" kern="1200">
+        <a:defRPr sz="2229" kern="1200">
           <a:solidFill>
             <a:schemeClr val="tx1"/>
           </a:solidFill>
@@ -3050,16 +3376,16 @@
       </a:lvl1pPr>
     </p:titleStyle>
     <p:bodyStyle>
-      <a:lvl1pPr marL="228600" indent="-228600" algn="l" defTabSz="914400" rtl="0" eaLnBrk="1" latinLnBrk="0" hangingPunct="1">
+      <a:lvl1pPr marL="115832" indent="-115832" algn="l" defTabSz="463326" rtl="0" eaLnBrk="1" latinLnBrk="0" hangingPunct="1">
         <a:lnSpc>
           <a:spcPct val="90000"/>
         </a:lnSpc>
         <a:spcBef>
-          <a:spcPts val="1000"/>
+          <a:spcPts val="507"/>
         </a:spcBef>
         <a:buFont typeface="Arial" panose="020B0604020202020204" pitchFamily="34" charset="0"/>
         <a:buChar char="•"/>
-        <a:defRPr sz="2800" kern="1200">
+        <a:defRPr sz="1419" kern="1200">
           <a:solidFill>
             <a:schemeClr val="tx1"/>
           </a:solidFill>
@@ -3068,16 +3394,16 @@
           <a:cs typeface="+mn-cs"/>
         </a:defRPr>
       </a:lvl1pPr>
-      <a:lvl2pPr marL="685800" indent="-228600" algn="l" defTabSz="914400" rtl="0" eaLnBrk="1" latinLnBrk="0" hangingPunct="1">
+      <a:lvl2pPr marL="347495" indent="-115832" algn="l" defTabSz="463326" rtl="0" eaLnBrk="1" latinLnBrk="0" hangingPunct="1">
         <a:lnSpc>
           <a:spcPct val="90000"/>
         </a:lnSpc>
         <a:spcBef>
-          <a:spcPts val="500"/>
+          <a:spcPts val="253"/>
         </a:spcBef>
         <a:buFont typeface="Arial" panose="020B0604020202020204" pitchFamily="34" charset="0"/>
         <a:buChar char="•"/>
-        <a:defRPr sz="2400" kern="1200">
+        <a:defRPr sz="1216" kern="1200">
           <a:solidFill>
             <a:schemeClr val="tx1"/>
           </a:solidFill>
@@ -3086,16 +3412,16 @@
           <a:cs typeface="+mn-cs"/>
         </a:defRPr>
       </a:lvl2pPr>
-      <a:lvl3pPr marL="1143000" indent="-228600" algn="l" defTabSz="914400" rtl="0" eaLnBrk="1" latinLnBrk="0" hangingPunct="1">
+      <a:lvl3pPr marL="579158" indent="-115832" algn="l" defTabSz="463326" rtl="0" eaLnBrk="1" latinLnBrk="0" hangingPunct="1">
         <a:lnSpc>
           <a:spcPct val="90000"/>
         </a:lnSpc>
         <a:spcBef>
-          <a:spcPts val="500"/>
+          <a:spcPts val="253"/>
         </a:spcBef>
         <a:buFont typeface="Arial" panose="020B0604020202020204" pitchFamily="34" charset="0"/>
         <a:buChar char="•"/>
-        <a:defRPr sz="2000" kern="1200">
+        <a:defRPr sz="1013" kern="1200">
           <a:solidFill>
             <a:schemeClr val="tx1"/>
           </a:solidFill>
@@ -3104,16 +3430,16 @@
           <a:cs typeface="+mn-cs"/>
         </a:defRPr>
       </a:lvl3pPr>
-      <a:lvl4pPr marL="1600200" indent="-228600" algn="l" defTabSz="914400" rtl="0" eaLnBrk="1" latinLnBrk="0" hangingPunct="1">
+      <a:lvl4pPr marL="810821" indent="-115832" algn="l" defTabSz="463326" rtl="0" eaLnBrk="1" latinLnBrk="0" hangingPunct="1">
         <a:lnSpc>
           <a:spcPct val="90000"/>
         </a:lnSpc>
         <a:spcBef>
-          <a:spcPts val="500"/>
+          <a:spcPts val="253"/>
         </a:spcBef>
         <a:buFont typeface="Arial" panose="020B0604020202020204" pitchFamily="34" charset="0"/>
         <a:buChar char="•"/>
-        <a:defRPr sz="1800" kern="1200">
+        <a:defRPr sz="912" kern="1200">
           <a:solidFill>
             <a:schemeClr val="tx1"/>
           </a:solidFill>
@@ -3122,16 +3448,16 @@
           <a:cs typeface="+mn-cs"/>
         </a:defRPr>
       </a:lvl4pPr>
-      <a:lvl5pPr marL="2057400" indent="-228600" algn="l" defTabSz="914400" rtl="0" eaLnBrk="1" latinLnBrk="0" hangingPunct="1">
+      <a:lvl5pPr marL="1042485" indent="-115832" algn="l" defTabSz="463326" rtl="0" eaLnBrk="1" latinLnBrk="0" hangingPunct="1">
         <a:lnSpc>
           <a:spcPct val="90000"/>
         </a:lnSpc>
         <a:spcBef>
-          <a:spcPts val="500"/>
+          <a:spcPts val="253"/>
         </a:spcBef>
         <a:buFont typeface="Arial" panose="020B0604020202020204" pitchFamily="34" charset="0"/>
         <a:buChar char="•"/>
-        <a:defRPr sz="1800" kern="1200">
+        <a:defRPr sz="912" kern="1200">
           <a:solidFill>
             <a:schemeClr val="tx1"/>
           </a:solidFill>
@@ -3140,16 +3466,16 @@
           <a:cs typeface="+mn-cs"/>
         </a:defRPr>
       </a:lvl5pPr>
-      <a:lvl6pPr marL="2514600" indent="-228600" algn="l" defTabSz="914400" rtl="0" eaLnBrk="1" latinLnBrk="0" hangingPunct="1">
+      <a:lvl6pPr marL="1274148" indent="-115832" algn="l" defTabSz="463326" rtl="0" eaLnBrk="1" latinLnBrk="0" hangingPunct="1">
         <a:lnSpc>
           <a:spcPct val="90000"/>
         </a:lnSpc>
         <a:spcBef>
-          <a:spcPts val="500"/>
+          <a:spcPts val="253"/>
         </a:spcBef>
         <a:buFont typeface="Arial" panose="020B0604020202020204" pitchFamily="34" charset="0"/>
         <a:buChar char="•"/>
-        <a:defRPr sz="1800" kern="1200">
+        <a:defRPr sz="912" kern="1200">
           <a:solidFill>
             <a:schemeClr val="tx1"/>
           </a:solidFill>
@@ -3158,16 +3484,16 @@
           <a:cs typeface="+mn-cs"/>
         </a:defRPr>
       </a:lvl6pPr>
-      <a:lvl7pPr marL="2971800" indent="-228600" algn="l" defTabSz="914400" rtl="0" eaLnBrk="1" latinLnBrk="0" hangingPunct="1">
+      <a:lvl7pPr marL="1505811" indent="-115832" algn="l" defTabSz="463326" rtl="0" eaLnBrk="1" latinLnBrk="0" hangingPunct="1">
         <a:lnSpc>
           <a:spcPct val="90000"/>
         </a:lnSpc>
         <a:spcBef>
-          <a:spcPts val="500"/>
+          <a:spcPts val="253"/>
         </a:spcBef>
         <a:buFont typeface="Arial" panose="020B0604020202020204" pitchFamily="34" charset="0"/>
         <a:buChar char="•"/>
-        <a:defRPr sz="1800" kern="1200">
+        <a:defRPr sz="912" kern="1200">
           <a:solidFill>
             <a:schemeClr val="tx1"/>
           </a:solidFill>
@@ -3176,16 +3502,16 @@
           <a:cs typeface="+mn-cs"/>
         </a:defRPr>
       </a:lvl7pPr>
-      <a:lvl8pPr marL="3429000" indent="-228600" algn="l" defTabSz="914400" rtl="0" eaLnBrk="1" latinLnBrk="0" hangingPunct="1">
+      <a:lvl8pPr marL="1737474" indent="-115832" algn="l" defTabSz="463326" rtl="0" eaLnBrk="1" latinLnBrk="0" hangingPunct="1">
         <a:lnSpc>
           <a:spcPct val="90000"/>
         </a:lnSpc>
         <a:spcBef>
-          <a:spcPts val="500"/>
+          <a:spcPts val="253"/>
         </a:spcBef>
         <a:buFont typeface="Arial" panose="020B0604020202020204" pitchFamily="34" charset="0"/>
         <a:buChar char="•"/>
-        <a:defRPr sz="1800" kern="1200">
+        <a:defRPr sz="912" kern="1200">
           <a:solidFill>
             <a:schemeClr val="tx1"/>
           </a:solidFill>
@@ -3194,16 +3520,16 @@
           <a:cs typeface="+mn-cs"/>
         </a:defRPr>
       </a:lvl8pPr>
-      <a:lvl9pPr marL="3886200" indent="-228600" algn="l" defTabSz="914400" rtl="0" eaLnBrk="1" latinLnBrk="0" hangingPunct="1">
+      <a:lvl9pPr marL="1969138" indent="-115832" algn="l" defTabSz="463326" rtl="0" eaLnBrk="1" latinLnBrk="0" hangingPunct="1">
         <a:lnSpc>
           <a:spcPct val="90000"/>
         </a:lnSpc>
         <a:spcBef>
-          <a:spcPts val="500"/>
+          <a:spcPts val="253"/>
         </a:spcBef>
         <a:buFont typeface="Arial" panose="020B0604020202020204" pitchFamily="34" charset="0"/>
         <a:buChar char="•"/>
-        <a:defRPr sz="1800" kern="1200">
+        <a:defRPr sz="912" kern="1200">
           <a:solidFill>
             <a:schemeClr val="tx1"/>
           </a:solidFill>
@@ -3217,8 +3543,8 @@
       <a:defPPr>
         <a:defRPr lang="en-US"/>
       </a:defPPr>
-      <a:lvl1pPr marL="0" algn="l" defTabSz="914400" rtl="0" eaLnBrk="1" latinLnBrk="0" hangingPunct="1">
-        <a:defRPr sz="1800" kern="1200">
+      <a:lvl1pPr marL="0" algn="l" defTabSz="463326" rtl="0" eaLnBrk="1" latinLnBrk="0" hangingPunct="1">
+        <a:defRPr sz="912" kern="1200">
           <a:solidFill>
             <a:schemeClr val="tx1"/>
           </a:solidFill>
@@ -3227,8 +3553,8 @@
           <a:cs typeface="+mn-cs"/>
         </a:defRPr>
       </a:lvl1pPr>
-      <a:lvl2pPr marL="457200" algn="l" defTabSz="914400" rtl="0" eaLnBrk="1" latinLnBrk="0" hangingPunct="1">
-        <a:defRPr sz="1800" kern="1200">
+      <a:lvl2pPr marL="231663" algn="l" defTabSz="463326" rtl="0" eaLnBrk="1" latinLnBrk="0" hangingPunct="1">
+        <a:defRPr sz="912" kern="1200">
           <a:solidFill>
             <a:schemeClr val="tx1"/>
           </a:solidFill>
@@ -3237,8 +3563,8 @@
           <a:cs typeface="+mn-cs"/>
         </a:defRPr>
       </a:lvl2pPr>
-      <a:lvl3pPr marL="914400" algn="l" defTabSz="914400" rtl="0" eaLnBrk="1" latinLnBrk="0" hangingPunct="1">
-        <a:defRPr sz="1800" kern="1200">
+      <a:lvl3pPr marL="463326" algn="l" defTabSz="463326" rtl="0" eaLnBrk="1" latinLnBrk="0" hangingPunct="1">
+        <a:defRPr sz="912" kern="1200">
           <a:solidFill>
             <a:schemeClr val="tx1"/>
           </a:solidFill>
@@ -3247,8 +3573,8 @@
           <a:cs typeface="+mn-cs"/>
         </a:defRPr>
       </a:lvl3pPr>
-      <a:lvl4pPr marL="1371600" algn="l" defTabSz="914400" rtl="0" eaLnBrk="1" latinLnBrk="0" hangingPunct="1">
-        <a:defRPr sz="1800" kern="1200">
+      <a:lvl4pPr marL="694990" algn="l" defTabSz="463326" rtl="0" eaLnBrk="1" latinLnBrk="0" hangingPunct="1">
+        <a:defRPr sz="912" kern="1200">
           <a:solidFill>
             <a:schemeClr val="tx1"/>
           </a:solidFill>
@@ -3257,8 +3583,8 @@
           <a:cs typeface="+mn-cs"/>
         </a:defRPr>
       </a:lvl4pPr>
-      <a:lvl5pPr marL="1828800" algn="l" defTabSz="914400" rtl="0" eaLnBrk="1" latinLnBrk="0" hangingPunct="1">
-        <a:defRPr sz="1800" kern="1200">
+      <a:lvl5pPr marL="926653" algn="l" defTabSz="463326" rtl="0" eaLnBrk="1" latinLnBrk="0" hangingPunct="1">
+        <a:defRPr sz="912" kern="1200">
           <a:solidFill>
             <a:schemeClr val="tx1"/>
           </a:solidFill>
@@ -3267,8 +3593,8 @@
           <a:cs typeface="+mn-cs"/>
         </a:defRPr>
       </a:lvl5pPr>
-      <a:lvl6pPr marL="2286000" algn="l" defTabSz="914400" rtl="0" eaLnBrk="1" latinLnBrk="0" hangingPunct="1">
-        <a:defRPr sz="1800" kern="1200">
+      <a:lvl6pPr marL="1158316" algn="l" defTabSz="463326" rtl="0" eaLnBrk="1" latinLnBrk="0" hangingPunct="1">
+        <a:defRPr sz="912" kern="1200">
           <a:solidFill>
             <a:schemeClr val="tx1"/>
           </a:solidFill>
@@ -3277,8 +3603,8 @@
           <a:cs typeface="+mn-cs"/>
         </a:defRPr>
       </a:lvl6pPr>
-      <a:lvl7pPr marL="2743200" algn="l" defTabSz="914400" rtl="0" eaLnBrk="1" latinLnBrk="0" hangingPunct="1">
-        <a:defRPr sz="1800" kern="1200">
+      <a:lvl7pPr marL="1389979" algn="l" defTabSz="463326" rtl="0" eaLnBrk="1" latinLnBrk="0" hangingPunct="1">
+        <a:defRPr sz="912" kern="1200">
           <a:solidFill>
             <a:schemeClr val="tx1"/>
           </a:solidFill>
@@ -3287,8 +3613,8 @@
           <a:cs typeface="+mn-cs"/>
         </a:defRPr>
       </a:lvl7pPr>
-      <a:lvl8pPr marL="3200400" algn="l" defTabSz="914400" rtl="0" eaLnBrk="1" latinLnBrk="0" hangingPunct="1">
-        <a:defRPr sz="1800" kern="1200">
+      <a:lvl8pPr marL="1621643" algn="l" defTabSz="463326" rtl="0" eaLnBrk="1" latinLnBrk="0" hangingPunct="1">
+        <a:defRPr sz="912" kern="1200">
           <a:solidFill>
             <a:schemeClr val="tx1"/>
           </a:solidFill>
@@ -3297,8 +3623,8 @@
           <a:cs typeface="+mn-cs"/>
         </a:defRPr>
       </a:lvl8pPr>
-      <a:lvl9pPr marL="3657600" algn="l" defTabSz="914400" rtl="0" eaLnBrk="1" latinLnBrk="0" hangingPunct="1">
-        <a:defRPr sz="1800" kern="1200">
+      <a:lvl9pPr marL="1853306" algn="l" defTabSz="463326" rtl="0" eaLnBrk="1" latinLnBrk="0" hangingPunct="1">
+        <a:defRPr sz="912" kern="1200">
           <a:solidFill>
             <a:schemeClr val="tx1"/>
           </a:solidFill>
@@ -3331,10 +3657,10 @@
       </p:grpSpPr>
       <p:pic>
         <p:nvPicPr>
-          <p:cNvPr id="5" name="Picture 4" descr="Chart, scatter chart&#10;&#10;Description automatically generated">
+          <p:cNvPr id="3" name="Picture 2" descr="Chart, scatter chart&#10;&#10;Description automatically generated">
             <a:extLst>
               <a:ext uri="{FF2B5EF4-FFF2-40B4-BE49-F238E27FC236}">
-                <a16:creationId xmlns:a16="http://schemas.microsoft.com/office/drawing/2014/main" id="{91A809A3-ED46-5A40-83D7-EF865668551C}"/>
+                <a16:creationId xmlns:a16="http://schemas.microsoft.com/office/drawing/2014/main" id="{3F073BA8-3E66-BF47-9138-5B0D750AC3A2}"/>
               </a:ext>
             </a:extLst>
           </p:cNvPr>
@@ -3351,8 +3677,8 @@
         </p:blipFill>
         <p:spPr>
           <a:xfrm>
-            <a:off x="90526" y="57033"/>
-            <a:ext cx="2273642" cy="3450858"/>
+            <a:off x="119511" y="0"/>
+            <a:ext cx="2289574" cy="3475038"/>
           </a:xfrm>
           <a:prstGeom prst="rect">
             <a:avLst/>
@@ -3361,10 +3687,10 @@
       </p:pic>
       <p:pic>
         <p:nvPicPr>
-          <p:cNvPr id="7" name="Graphic 6">
+          <p:cNvPr id="14" name="Graphic 13">
             <a:extLst>
               <a:ext uri="{FF2B5EF4-FFF2-40B4-BE49-F238E27FC236}">
-                <a16:creationId xmlns:a16="http://schemas.microsoft.com/office/drawing/2014/main" id="{608B2333-A233-B745-9768-07F904B1C6C2}"/>
+                <a16:creationId xmlns:a16="http://schemas.microsoft.com/office/drawing/2014/main" id="{21580B54-017A-2145-807B-64089C2BAD71}"/>
               </a:ext>
             </a:extLst>
           </p:cNvPr>
@@ -3386,8 +3712,8 @@
         </p:blipFill>
         <p:spPr>
           <a:xfrm>
-            <a:off x="2882647" y="135923"/>
-            <a:ext cx="9309353" cy="3371967"/>
+            <a:off x="2792121" y="57033"/>
+            <a:ext cx="9399879" cy="3404757"/>
           </a:xfrm>
           <a:prstGeom prst="rect">
             <a:avLst/>
@@ -3396,10 +3722,10 @@
       </p:pic>
       <p:sp>
         <p:nvSpPr>
-          <p:cNvPr id="8" name="TextBox 7">
+          <p:cNvPr id="15" name="TextBox 14">
             <a:extLst>
               <a:ext uri="{FF2B5EF4-FFF2-40B4-BE49-F238E27FC236}">
-                <a16:creationId xmlns:a16="http://schemas.microsoft.com/office/drawing/2014/main" id="{0A2DCC77-4547-B243-BA23-84A70436873F}"/>
+                <a16:creationId xmlns:a16="http://schemas.microsoft.com/office/drawing/2014/main" id="{F49D3BDC-B65E-1C47-B28C-89C8BC0E608C}"/>
               </a:ext>
             </a:extLst>
           </p:cNvPr>
@@ -3434,10 +3760,10 @@
       </p:sp>
       <p:sp>
         <p:nvSpPr>
-          <p:cNvPr id="9" name="TextBox 8">
+          <p:cNvPr id="16" name="TextBox 15">
             <a:extLst>
               <a:ext uri="{FF2B5EF4-FFF2-40B4-BE49-F238E27FC236}">
-                <a16:creationId xmlns:a16="http://schemas.microsoft.com/office/drawing/2014/main" id="{A2439F6C-3D25-B544-8BEB-022CB30EF76F}"/>
+                <a16:creationId xmlns:a16="http://schemas.microsoft.com/office/drawing/2014/main" id="{E83D7207-314C-2744-B03A-AFB57F0C1C12}"/>
               </a:ext>
             </a:extLst>
           </p:cNvPr>
@@ -3446,7 +3772,7 @@
         </p:nvSpPr>
         <p:spPr>
           <a:xfrm>
-            <a:off x="2823948" y="-93046"/>
+            <a:off x="2618148" y="-94909"/>
             <a:ext cx="389850" cy="461665"/>
           </a:xfrm>
           <a:prstGeom prst="rect">
@@ -3486,7 +3812,7 @@
 <file path=ppt/theme/theme1.xml><?xml version="1.0" encoding="utf-8"?>
 <a:theme xmlns:a="http://schemas.openxmlformats.org/drawingml/2006/main" name="Office Theme">
   <a:themeElements>
-    <a:clrScheme name="Office">
+    <a:clrScheme name="Office Theme">
       <a:dk1>
         <a:sysClr val="windowText" lastClr="000000"/>
       </a:dk1>
@@ -3524,7 +3850,7 @@
         <a:srgbClr val="954F72"/>
       </a:folHlink>
     </a:clrScheme>
-    <a:fontScheme name="Office">
+    <a:fontScheme name="Office Theme">
       <a:majorFont>
         <a:latin typeface="Calibri Light" panose="020F0302020204030204"/>
         <a:ea typeface=""/>
@@ -3559,23 +3885,6 @@
         <a:font script="Viet" typeface="Times New Roman"/>
         <a:font script="Uigh" typeface="Microsoft Uighur"/>
         <a:font script="Geor" typeface="Sylfaen"/>
-        <a:font script="Armn" typeface="Arial"/>
-        <a:font script="Bugi" typeface="Leelawadee UI"/>
-        <a:font script="Bopo" typeface="Microsoft JhengHei"/>
-        <a:font script="Java" typeface="Javanese Text"/>
-        <a:font script="Lisu" typeface="Segoe UI"/>
-        <a:font script="Mymr" typeface="Myanmar Text"/>
-        <a:font script="Nkoo" typeface="Ebrima"/>
-        <a:font script="Olck" typeface="Nirmala UI"/>
-        <a:font script="Osma" typeface="Ebrima"/>
-        <a:font script="Phag" typeface="Phagspa"/>
-        <a:font script="Syrn" typeface="Estrangelo Edessa"/>
-        <a:font script="Syrj" typeface="Estrangelo Edessa"/>
-        <a:font script="Syre" typeface="Estrangelo Edessa"/>
-        <a:font script="Sora" typeface="Nirmala UI"/>
-        <a:font script="Tale" typeface="Microsoft Tai Le"/>
-        <a:font script="Talu" typeface="Microsoft New Tai Lue"/>
-        <a:font script="Tfng" typeface="Ebrima"/>
       </a:majorFont>
       <a:minorFont>
         <a:latin typeface="Calibri" panose="020F0502020204030204"/>
@@ -3611,26 +3920,9 @@
         <a:font script="Viet" typeface="Arial"/>
         <a:font script="Uigh" typeface="Microsoft Uighur"/>
         <a:font script="Geor" typeface="Sylfaen"/>
-        <a:font script="Armn" typeface="Arial"/>
-        <a:font script="Bugi" typeface="Leelawadee UI"/>
-        <a:font script="Bopo" typeface="Microsoft JhengHei"/>
-        <a:font script="Java" typeface="Javanese Text"/>
-        <a:font script="Lisu" typeface="Segoe UI"/>
-        <a:font script="Mymr" typeface="Myanmar Text"/>
-        <a:font script="Nkoo" typeface="Ebrima"/>
-        <a:font script="Olck" typeface="Nirmala UI"/>
-        <a:font script="Osma" typeface="Ebrima"/>
-        <a:font script="Phag" typeface="Phagspa"/>
-        <a:font script="Syrn" typeface="Estrangelo Edessa"/>
-        <a:font script="Syrj" typeface="Estrangelo Edessa"/>
-        <a:font script="Syre" typeface="Estrangelo Edessa"/>
-        <a:font script="Sora" typeface="Nirmala UI"/>
-        <a:font script="Tale" typeface="Microsoft Tai Le"/>
-        <a:font script="Talu" typeface="Microsoft New Tai Lue"/>
-        <a:font script="Tfng" typeface="Ebrima"/>
       </a:minorFont>
     </a:fontScheme>
-    <a:fmtScheme name="Office">
+    <a:fmtScheme name="Office Theme">
       <a:fillStyleLst>
         <a:solidFill>
           <a:schemeClr val="phClr"/>

</xml_diff>